<commit_message>
updating slides to new structure
</commit_message>
<xml_diff>
--- a/ClassMaterials/ArraysAnd2DArrays/Slides/Part3-2D-Arrays.pptx
+++ b/ClassMaterials/ArraysAnd2DArrays/Slides/Part3-2D-Arrays.pptx
@@ -316,7 +316,7 @@
               <a:pPr>
                 <a:defRPr/>
               </a:pPr>
-              <a:t>12/1/2022</a:t>
+              <a:t>3/3/2025</a:t>
             </a:fld>
             <a:endParaRPr lang="en-US"/>
           </a:p>
@@ -432,6 +432,370 @@
   </p:cSld>
   <p:clrMap bg1="lt1" tx1="dk1" bg2="lt2" tx2="dk2" accent1="accent1" accent2="accent2" accent3="accent3" accent4="accent4" accent5="accent5" accent6="accent6" hlink="hlink" folHlink="folHlink"/>
 </p:handoutMaster>
+</file>
+
+<file path=ppt/ink/ink1.xml><?xml version="1.0" encoding="utf-8"?>
+<inkml:ink xmlns:inkml="http://www.w3.org/2003/InkML">
+  <inkml:definitions>
+    <inkml:context xml:id="ctx0">
+      <inkml:inkSource xml:id="inkSrc0">
+        <inkml:traceFormat>
+          <inkml:channel name="X" type="integer" min="-2.14748E9" max="2.14748E9" units="cm"/>
+          <inkml:channel name="Y" type="integer" min="-2.14748E9" max="2.14748E9" units="cm"/>
+          <inkml:channel name="F" type="integer" max="32767" units="dev"/>
+        </inkml:traceFormat>
+        <inkml:channelProperties>
+          <inkml:channelProperty channel="X" name="resolution" value="1000" units="1/cm"/>
+          <inkml:channelProperty channel="Y" name="resolution" value="1000" units="1/cm"/>
+          <inkml:channelProperty channel="F" name="resolution" value="0" units="1/dev"/>
+        </inkml:channelProperties>
+      </inkml:inkSource>
+      <inkml:timestamp xml:id="ts0" timeString="2025-03-03T18:46:14.800"/>
+    </inkml:context>
+    <inkml:brush xml:id="br0">
+      <inkml:brushProperty name="width" value="0.1" units="cm"/>
+      <inkml:brushProperty name="height" value="0.1" units="cm"/>
+      <inkml:brushProperty name="color" value="#E71224"/>
+    </inkml:brush>
+  </inkml:definitions>
+  <inkml:trace contextRef="#ctx0" brushRef="#br0">1322 58 24575,'-204'-1'0,"-221"3"0,256 12 0,-33 0 0,186-13 0,-1 1 0,0-1 0,1 2 0,-1 1 0,1 0 0,0 1 0,-18 7 0,13-2 0,-1 1 0,1 1 0,1 1 0,-27 21 0,43-31 0,1 0 0,-1-1 0,1 2 0,0 0 0,0-1 0,0 0 0,1 1 0,0 0 0,-1 0 0,1 0 0,0 0 0,0 0 0,1 0 0,-1 1 0,1-1 0,1 1 0,-2 4 0,2-5 0,0-1 0,0 1 0,1 0 0,0 0 0,-1 0 0,1 0 0,0 0 0,1-1 0,-2 0 0,2 1 0,0-1 0,0 1 0,0-1 0,0 0 0,1 0 0,-1 0 0,0 0 0,1 0 0,0-1 0,4 4 0,12 9 0,0-2 0,1 0 0,1-1 0,0-1 0,29 10 0,113 31 0,-147-48 0,58 13 0,1-2 0,108 6 0,-78-11 0,108 5 0,447-16 0,-494-14 0,-32 3 0,52-7 0,-96 9 0,-20 1 0,1-3 0,-2-4 0,90-30 0,-144 40 0,1-1 0,0 0 0,-1 0 0,0-2 0,-1 0 0,0-1 0,16-15 0,-25 20 0,0 1 0,0-1 0,0 0 0,-1-1 0,0 1 0,0-1 0,-1 0 0,0 1 0,1-2 0,-2 1 0,0-1 0,1 1 0,-2-1 0,1 1 0,0-1 0,-1 0 0,-1 1 0,0-1 0,0 0 0,0-13 0,-2 14 0,1 1 0,-1 0 0,1 0 0,-2-1 0,2 1 0,-2 1 0,0-1 0,1 0 0,-1 0 0,-1 1 0,1 0 0,-1-1 0,1 2 0,-1-1 0,0 0 0,0 1 0,-1-1 0,-8-4 0,-6-1 0,1 0 0,-2 1 0,-32-9 0,17 5 0,7 3 0,-2-3 0,0 2 0,-2 1 0,-57-8 0,-195 14 0,139 5 0,-492-2 0,593 3 0,-56 9 0,-15 1 0,104-12-455,1-1 0,-21 5 0,13 2-6371</inkml:trace>
+</inkml:ink>
+</file>
+
+<file path=ppt/ink/ink10.xml><?xml version="1.0" encoding="utf-8"?>
+<inkml:ink xmlns:inkml="http://www.w3.org/2003/InkML">
+  <inkml:definitions>
+    <inkml:context xml:id="ctx0">
+      <inkml:inkSource xml:id="inkSrc0">
+        <inkml:traceFormat>
+          <inkml:channel name="X" type="integer" min="-2.14748E9" max="2.14748E9" units="cm"/>
+          <inkml:channel name="Y" type="integer" min="-2.14748E9" max="2.14748E9" units="cm"/>
+          <inkml:channel name="F" type="integer" max="32767" units="dev"/>
+        </inkml:traceFormat>
+        <inkml:channelProperties>
+          <inkml:channelProperty channel="X" name="resolution" value="1000" units="1/cm"/>
+          <inkml:channelProperty channel="Y" name="resolution" value="1000" units="1/cm"/>
+          <inkml:channelProperty channel="F" name="resolution" value="0" units="1/dev"/>
+        </inkml:channelProperties>
+      </inkml:inkSource>
+      <inkml:timestamp xml:id="ts0" timeString="2025-03-03T18:48:07.491"/>
+    </inkml:context>
+    <inkml:brush xml:id="br0">
+      <inkml:brushProperty name="width" value="0.1" units="cm"/>
+      <inkml:brushProperty name="height" value="0.1" units="cm"/>
+      <inkml:brushProperty name="color" value="#E71224"/>
+    </inkml:brush>
+  </inkml:definitions>
+  <inkml:trace contextRef="#ctx0" brushRef="#br0">1 1062 24575,'1'-6'0,"0"-1"0,0 1 0,0-1 0,1 1 0,0 0 0,1 0 0,-1 0 0,1 0 0,0 0 0,1 1 0,5-8 0,8-10 0,24-24 0,-40 47 0,34-34 0,2 3 0,1 0 0,81-47 0,-58 39 0,-24 18 0,0 1 0,62-22 0,-61 27 0,0-1 0,55-34 0,63-39 0,-104 58 0,-36 21 0,1 1 0,0 0 0,27-10 0,28-9 0,89-46 0,-158 72 0,1 1 0,-1-1 0,0 0 0,1 0 0,-1 0 0,0-1 0,0 1 0,0-1 0,-1 0 0,1 1 0,0-1 0,1-4 0,-3 6 0,-1 0 0,1 0 0,-1 0 0,0-1 0,1 1 0,-1 0 0,0 0 0,0 0 0,0 0 0,0-1 0,0 1 0,0 0 0,0 0 0,-1 0 0,1 0 0,0-1 0,-1 0 0,0-1 0,-1 1 0,1-1 0,-1 1 0,1 0 0,-1-1 0,0 1 0,0 0 0,0 0 0,-4-3 0,-17-10 0,0 1 0,-1 1 0,-1 2 0,0 0 0,-48-14 0,14 5 0,43 14 0,-18-6 0,0-2 0,-53-29 0,133 56 0,166 80 0,-106-43 0,-97-47 0,-1 1 0,1 1 0,-1-1 0,-1 1 0,1 1 0,-1-1 0,0 1 0,0 0 0,0 1 0,-1 0 0,6 8 0,-9-9 0,1 1 0,-1 0 0,0 0 0,0 0 0,-1 0 0,0 0 0,0 0 0,-1 1 0,0-1 0,0 1 0,-1-1 0,0 1 0,0-1 0,-2 13 0,-12 61 0,-4 0 0,-43 121 0,52-172-1365,2-4-5461</inkml:trace>
+</inkml:ink>
+</file>
+
+<file path=ppt/ink/ink11.xml><?xml version="1.0" encoding="utf-8"?>
+<inkml:ink xmlns:inkml="http://www.w3.org/2003/InkML">
+  <inkml:definitions>
+    <inkml:context xml:id="ctx0">
+      <inkml:inkSource xml:id="inkSrc0">
+        <inkml:traceFormat>
+          <inkml:channel name="X" type="integer" min="-2.14748E9" max="2.14748E9" units="cm"/>
+          <inkml:channel name="Y" type="integer" min="-2.14748E9" max="2.14748E9" units="cm"/>
+          <inkml:channel name="F" type="integer" max="32767" units="dev"/>
+        </inkml:traceFormat>
+        <inkml:channelProperties>
+          <inkml:channelProperty channel="X" name="resolution" value="1000" units="1/cm"/>
+          <inkml:channelProperty channel="Y" name="resolution" value="1000" units="1/cm"/>
+          <inkml:channelProperty channel="F" name="resolution" value="0" units="1/dev"/>
+        </inkml:channelProperties>
+      </inkml:inkSource>
+      <inkml:timestamp xml:id="ts0" timeString="2025-03-03T18:49:18.798"/>
+    </inkml:context>
+    <inkml:brush xml:id="br0">
+      <inkml:brushProperty name="width" value="0.1" units="cm"/>
+      <inkml:brushProperty name="height" value="0.1" units="cm"/>
+      <inkml:brushProperty name="color" value="#E71224"/>
+    </inkml:brush>
+  </inkml:definitions>
+  <inkml:trace contextRef="#ctx0" brushRef="#br0">2049 1 24575,'-27'2'0,"1"1"0,-1 1 0,1 1 0,1 1 0,-31 12 0,16-5 0,-42 8 0,-23-5 0,35-5 0,-103 28 0,66-9 0,-1-3 0,-185 19 0,222-39 0,0 3 0,-84 24 0,118-26 0,0-1 0,-70 4 0,60-7 0,-53 10 0,92-12 0,0 0 0,0 1 0,0 0 0,0 0 0,1 1 0,-1 0 0,1 1 0,0-1 0,0 1 0,1 0 0,-1 1 0,1 0 0,-10 13 0,7-12-136,0 1-1,0-1 1,0-1-1,-1 0 1,0 0-1,0-1 1,0 0-1,-1 0 0,-17 4 1,-5 2-6690</inkml:trace>
+</inkml:ink>
+</file>
+
+<file path=ppt/ink/ink12.xml><?xml version="1.0" encoding="utf-8"?>
+<inkml:ink xmlns:inkml="http://www.w3.org/2003/InkML">
+  <inkml:definitions>
+    <inkml:context xml:id="ctx0">
+      <inkml:inkSource xml:id="inkSrc0">
+        <inkml:traceFormat>
+          <inkml:channel name="X" type="integer" min="-2.14748E9" max="2.14748E9" units="cm"/>
+          <inkml:channel name="Y" type="integer" min="-2.14748E9" max="2.14748E9" units="cm"/>
+          <inkml:channel name="F" type="integer" max="32767" units="dev"/>
+        </inkml:traceFormat>
+        <inkml:channelProperties>
+          <inkml:channelProperty channel="X" name="resolution" value="1000" units="1/cm"/>
+          <inkml:channelProperty channel="Y" name="resolution" value="1000" units="1/cm"/>
+          <inkml:channelProperty channel="F" name="resolution" value="0" units="1/dev"/>
+        </inkml:channelProperties>
+      </inkml:inkSource>
+      <inkml:timestamp xml:id="ts0" timeString="2025-03-03T18:49:20.941"/>
+    </inkml:context>
+    <inkml:brush xml:id="br0">
+      <inkml:brushProperty name="width" value="0.1" units="cm"/>
+      <inkml:brushProperty name="height" value="0.1" units="cm"/>
+      <inkml:brushProperty name="color" value="#E71224"/>
+    </inkml:brush>
+  </inkml:definitions>
+  <inkml:trace contextRef="#ctx0" brushRef="#br0">4335 356 24575,'-13'-1'0,"0"0"0,0-1 0,-14-3 0,-19-4 0,-336-48 0,-96-10 0,350 54 0,-131-31 0,97 16 0,-239-10 0,-10-18 0,311 41 0,0 4 0,-1 5 0,0 3 0,1 6 0,-129 18 0,165-9 0,-98 33 0,22-6 0,-399 67 0,489-97 0,36-7 0,-17 3 0,0 1 0,0 1 0,0 1 0,-52 23 0,77-27 0,-1-1 0,1 1 0,0 1 0,0-1 0,1 1 0,-1 0 0,1 0 0,0 1 0,0 0 0,1 0 0,-1 0 0,1 0 0,1 0 0,-1 1 0,1 0 0,0 0 0,1 0 0,-1 0 0,2 0 0,-1 0 0,1 0 0,0 1 0,0-1 0,1 1 0,0-1 0,0 1 0,1-1 0,0 0 0,0 1 0,1-1 0,0 0 0,0 0 0,1 0 0,-1 0 0,2 0 0,-1-1 0,1 1 0,4 5 0,7 9 0,1-1 0,1 0 0,1-1 0,0-1 0,23 17 0,112 74 0,-112-82 0,0-2 0,76 34 0,-56-30 0,28 12 0,3-5 0,1-3 0,106 21 0,299 32 0,-464-81 0,603 84 0,-401-54 0,436 10 0,10-50 0,-577 0 0,168-31 0,-228 29 0,-11 1 0,0-1 0,-1-2 0,1-1 0,-2-2 0,1-1 0,47-27 0,-56 28 0,1 0 0,0 2 0,41-11 0,-27 10 0,-11 1 0,34-18 0,21-8 0,-66 30 0,-1 0 0,0-1 0,0 0 0,0-2 0,-1 0 0,26-20 0,-37 26 0,-1 0 0,1-1 0,-1 1 0,1-1 0,-1 0 0,0 0 0,-1 0 0,1 0 0,0 0 0,-1 0 0,0-1 0,0 1 0,-1-1 0,1 1 0,-1-1 0,0 0 0,0 0 0,-1 0 0,1 1 0,-1-1 0,0 0 0,0 0 0,-1 0 0,0 0 0,1 0 0,-1 1 0,-1-1 0,1 0 0,-4-6 0,-3-4 0,0 0 0,-1 1 0,0 0 0,-2 0 0,1 1 0,-2 1 0,-18-17 0,-101-71 0,69 56 0,23 17 0,-2 3 0,-53-24 0,-16-10 0,32 12-1365,39 24-5461</inkml:trace>
+</inkml:ink>
+</file>
+
+<file path=ppt/ink/ink13.xml><?xml version="1.0" encoding="utf-8"?>
+<inkml:ink xmlns:inkml="http://www.w3.org/2003/InkML">
+  <inkml:definitions>
+    <inkml:context xml:id="ctx0">
+      <inkml:inkSource xml:id="inkSrc0">
+        <inkml:traceFormat>
+          <inkml:channel name="X" type="integer" min="-2.14748E9" max="2.14748E9" units="cm"/>
+          <inkml:channel name="Y" type="integer" min="-2.14748E9" max="2.14748E9" units="cm"/>
+          <inkml:channel name="F" type="integer" max="32767" units="dev"/>
+        </inkml:traceFormat>
+        <inkml:channelProperties>
+          <inkml:channelProperty channel="X" name="resolution" value="1000" units="1/cm"/>
+          <inkml:channelProperty channel="Y" name="resolution" value="1000" units="1/cm"/>
+          <inkml:channelProperty channel="F" name="resolution" value="0" units="1/dev"/>
+        </inkml:channelProperties>
+      </inkml:inkSource>
+      <inkml:timestamp xml:id="ts0" timeString="2025-03-03T18:49:22.230"/>
+    </inkml:context>
+    <inkml:brush xml:id="br0">
+      <inkml:brushProperty name="width" value="0.1" units="cm"/>
+      <inkml:brushProperty name="height" value="0.1" units="cm"/>
+      <inkml:brushProperty name="color" value="#E71224"/>
+    </inkml:brush>
+  </inkml:definitions>
+  <inkml:trace contextRef="#ctx0" brushRef="#br0">282 28 24575,'0'-1'0,"0"-1"0,0 1 0,1 0 0,-1 0 0,0 0 0,-1 0 0,1 0 0,0 0 0,0 0 0,0 0 0,-1 0 0,1-1 0,0 1 0,-1 0 0,1 0 0,-1 0 0,1 0 0,-1 1 0,1-1 0,-1 0 0,0 0 0,0 0 0,1 0 0,-1 1 0,-2-2 0,2 2 0,0 0 0,-1-1 0,1 1 0,0 1 0,-1-1 0,1 0 0,0 0 0,-1 0 0,1 1 0,0-1 0,0 1 0,-1-1 0,1 1 0,0-1 0,0 1 0,0 0 0,-2 1 0,-9 7 0,1 0 0,-20 22 0,24-24 0,-30 33 0,2 2 0,-50 75 0,82-112 0,-1 1 0,1 0 0,-1 0 0,2 0 0,-1 0 0,1 0 0,0 1 0,0-1 0,0 1 0,0 11 0,2-15 0,1 1 0,-1-1 0,1 0 0,-1 1 0,1-1 0,0 0 0,1 1 0,-1-1 0,1 0 0,-1 0 0,1 0 0,0 0 0,0-1 0,0 1 0,0 0 0,1-1 0,-1 1 0,1-1 0,-1 0 0,1 0 0,0 0 0,5 3 0,291 155 0,-96-55 0,-161-83-1365,-7-5-5461</inkml:trace>
+</inkml:ink>
+</file>
+
+<file path=ppt/ink/ink2.xml><?xml version="1.0" encoding="utf-8"?>
+<inkml:ink xmlns:inkml="http://www.w3.org/2003/InkML">
+  <inkml:definitions>
+    <inkml:context xml:id="ctx0">
+      <inkml:inkSource xml:id="inkSrc0">
+        <inkml:traceFormat>
+          <inkml:channel name="X" type="integer" min="-2.14748E9" max="2.14748E9" units="cm"/>
+          <inkml:channel name="Y" type="integer" min="-2.14748E9" max="2.14748E9" units="cm"/>
+          <inkml:channel name="F" type="integer" max="32767" units="dev"/>
+        </inkml:traceFormat>
+        <inkml:channelProperties>
+          <inkml:channelProperty channel="X" name="resolution" value="1000" units="1/cm"/>
+          <inkml:channelProperty channel="Y" name="resolution" value="1000" units="1/cm"/>
+          <inkml:channelProperty channel="F" name="resolution" value="0" units="1/dev"/>
+        </inkml:channelProperties>
+      </inkml:inkSource>
+      <inkml:timestamp xml:id="ts0" timeString="2025-03-03T18:46:14.801"/>
+    </inkml:context>
+    <inkml:brush xml:id="br0">
+      <inkml:brushProperty name="width" value="0.1" units="cm"/>
+      <inkml:brushProperty name="height" value="0.1" units="cm"/>
+      <inkml:brushProperty name="color" value="#E71224"/>
+    </inkml:brush>
+  </inkml:definitions>
+  <inkml:trace contextRef="#ctx0" brushRef="#br0">1832 144 24575,'-1520'0'0,"1498"0"0,-1 2 0,1 0 0,0 2 0,0 1 0,0 0 0,1 2 0,-1 1 0,1 0 0,-32 19 0,48-24 0,0 1 0,0 0 0,1 0 0,0 0 0,0 0 0,0 1 0,1-1 0,-1 1 0,0 0 0,2 0 0,-1 1 0,0-2 0,2 2 0,-2 0 0,2-1 0,-1 1 0,0 0 0,2-1 0,-1 1 0,0 11 0,1 0 0,0 1 0,1-2 0,0 1 0,2 0 0,9 32 0,-7-31 0,1-1 0,1 0 0,1-1 0,0 1 0,1-1 0,0-1 0,2 0 0,0 0 0,0-1 0,2-1 0,-1 0 0,2 0 0,0-1 0,0 0 0,1-2 0,0 0 0,1-1 0,1 0 0,-1-1 0,1-1 0,0-1 0,26 7 0,5-3 0,145 35 0,-116-26 0,1-2 0,-1-4 0,1-4 0,121-1 0,-80-8 0,382 20 0,-355-3 0,268 25 0,346-38 0,-405-7 0,-336 3 0,40 1 0,95-12 0,-42-1 0,205 5 0,-214 9 0,-95-2 0,1 0 0,0-1 0,0 0 0,0-1 0,0 1 0,0-2 0,-1 1 0,1 0 0,-1-2 0,0 0 0,0 0 0,9-5 0,3-3 0,0 1 0,37-13 0,-32 15 0,39-23 0,-57 28 0,1 0 0,-2 0 0,1 0 0,0-2 0,-1 0 0,0 1 0,0-1 0,-1-1 0,0 1 0,1 0 0,-2-1 0,7-12 0,20-35 0,-23 41 0,0 1 0,-1-2 0,0 1 0,-2-1 0,1 1 0,3-16 0,-3 0 0,2 0 0,14-37 0,-16 50 0,-1 0 0,-1 0 0,0-1 0,-1 0 0,-1 0 0,0-1 0,-1-25 0,-1 39 0,-1 0 0,0-1 0,0 1 0,0 0 0,0 0 0,-1 0 0,1 0 0,-1 0 0,0 0 0,0 1 0,0-1 0,-1 1 0,-2-5 0,-1 3 0,0-2 0,0 2 0,-1-1 0,1 1 0,-1 0 0,-10-4 0,-1-1 0,-1 1 0,-1 2 0,0 0 0,-34-7 0,-78-8 0,-154-4 0,175 18 0,-195-24 0,-194-10 0,-60 43 0,195 0 0,116 14 0,27-1 0,-15-14-1365,211 0-5461</inkml:trace>
+</inkml:ink>
+</file>
+
+<file path=ppt/ink/ink3.xml><?xml version="1.0" encoding="utf-8"?>
+<inkml:ink xmlns:inkml="http://www.w3.org/2003/InkML">
+  <inkml:definitions>
+    <inkml:context xml:id="ctx0">
+      <inkml:inkSource xml:id="inkSrc0">
+        <inkml:traceFormat>
+          <inkml:channel name="X" type="integer" min="-2.14748E9" max="2.14748E9" units="cm"/>
+          <inkml:channel name="Y" type="integer" min="-2.14748E9" max="2.14748E9" units="cm"/>
+          <inkml:channel name="F" type="integer" max="32767" units="dev"/>
+        </inkml:traceFormat>
+        <inkml:channelProperties>
+          <inkml:channelProperty channel="X" name="resolution" value="1000" units="1/cm"/>
+          <inkml:channelProperty channel="Y" name="resolution" value="1000" units="1/cm"/>
+          <inkml:channelProperty channel="F" name="resolution" value="0" units="1/dev"/>
+        </inkml:channelProperties>
+      </inkml:inkSource>
+      <inkml:timestamp xml:id="ts0" timeString="2025-03-03T18:46:14.802"/>
+    </inkml:context>
+    <inkml:brush xml:id="br0">
+      <inkml:brushProperty name="width" value="0.1" units="cm"/>
+      <inkml:brushProperty name="height" value="0.1" units="cm"/>
+      <inkml:brushProperty name="color" value="#E71224"/>
+    </inkml:brush>
+  </inkml:definitions>
+  <inkml:trace contextRef="#ctx0" brushRef="#br0">1243 87 24575,'-75'-5'0,"0"-2"0,-100-23 0,-59-7 0,-133 30 0,360 7 0,-4 0 0,-1 1 0,0 0 0,-1 0 0,1 2 0,1-1 0,-1 1 0,1 1 0,-1 0 0,1 0 0,1 2 0,-2 0 0,2-1 0,0 2 0,0 0 0,1 0 0,-1 1 0,2 0 0,-1 1 0,1 0 0,0 0 0,1 1 0,-7 11 0,3-1 0,1 0 0,1 1 0,0 0 0,2 1 0,1 0 0,-4 22 0,8-32 0,1 0 0,-1 1 0,2-1 0,0 0 0,1 0 0,0 1 0,0-1 0,2 0 0,-1 0 0,1 0 0,1 0 0,9 20 0,-10-27 0,2 2 0,-1-2 0,0 1 0,1 0 0,0-2 0,0 1 0,1 0 0,-1 0 0,1-1 0,-1 0 0,12 6 0,6 0 0,47 17 0,-44-18 0,51 16 0,0-4 0,112 17 0,-76-25 0,123 1 0,116-21 0,-260-1 0,164-35 0,-234 38 0,17-4 0,1-1 0,57-24 0,-89 29 0,1-1 0,-1 1 0,0-1 0,0 0 0,-1-1 0,0 0 0,1 0 0,-2-1 0,0 0 0,0 0 0,0-1 0,-1 0 0,-1 1 0,9-19 0,-9 16 0,0 1 0,-1-1 0,-1 1 0,1-1 0,-2 0 0,1 0 0,-1 0 0,-1-1 0,0 2 0,0-1 0,-2-1 0,0 2 0,-2-14 0,1 16 0,0 2 0,0-1 0,0 1 0,-2-1 0,2 2 0,-2-2 0,1 2 0,0 0 0,-1-1 0,-1 1 0,0 1 0,2-1 0,-3 1 0,1 0 0,-8-4 0,-9-5 0,-2 2 0,-43-14 0,57 22 0,-25-8 30,-1 2 0,1 1 0,-52-4 0,-112 8-1515,175 5-5341</inkml:trace>
+</inkml:ink>
+</file>
+
+<file path=ppt/ink/ink4.xml><?xml version="1.0" encoding="utf-8"?>
+<inkml:ink xmlns:inkml="http://www.w3.org/2003/InkML">
+  <inkml:definitions>
+    <inkml:context xml:id="ctx0">
+      <inkml:inkSource xml:id="inkSrc0">
+        <inkml:traceFormat>
+          <inkml:channel name="X" type="integer" min="-2.14748E9" max="2.14748E9" units="cm"/>
+          <inkml:channel name="Y" type="integer" min="-2.14748E9" max="2.14748E9" units="cm"/>
+          <inkml:channel name="F" type="integer" max="32767" units="dev"/>
+        </inkml:traceFormat>
+        <inkml:channelProperties>
+          <inkml:channelProperty channel="X" name="resolution" value="1000" units="1/cm"/>
+          <inkml:channelProperty channel="Y" name="resolution" value="1000" units="1/cm"/>
+          <inkml:channelProperty channel="F" name="resolution" value="0" units="1/dev"/>
+        </inkml:channelProperties>
+      </inkml:inkSource>
+      <inkml:timestamp xml:id="ts0" timeString="2025-03-03T18:46:14.803"/>
+    </inkml:context>
+    <inkml:brush xml:id="br0">
+      <inkml:brushProperty name="width" value="0.1" units="cm"/>
+      <inkml:brushProperty name="height" value="0.1" units="cm"/>
+      <inkml:brushProperty name="color" value="#E71224"/>
+    </inkml:brush>
+  </inkml:definitions>
+  <inkml:trace contextRef="#ctx0" brushRef="#br0">21 1 24575,'1'3'0,"0"0"0,0 1 0,0 0 0,1-1 0,-1 0 0,1 0 0,0 1 0,-1-1 0,2 0 0,-1 0 0,0 0 0,0-1 0,4 4 0,1 2 0,83 88 0,7 10 0,-32-23 0,126 143 0,-174-209 0,1 0 0,24 16 0,-34-28 0,-1 0 0,1 0 0,0-1 0,0 0 0,0-1 0,1 0 0,-1 1 0,1-2 0,10 1 0,-16-2 0,0-1 0,0 0 0,-1-1 0,0 1 0,1 0 0,-1 0 0,1-1 0,-1 0 0,0 0 0,1 0 0,-1 0 0,1 1 0,-1-2 0,1 0 0,-2 2 0,2-2 0,-2 0 0,2 1 0,-2-1 0,1 0 0,-1 0 0,1 1 0,0-2 0,-1 1 0,0 0 0,1 0 0,-1-1 0,0 1 0,1-3 0,3-8 0,-1 0 0,-1 0 0,0 0 0,2-16 0,-3 18 0,10-49 0,39-107 0,-32 113 0,-29 78 0,1-2 0,0 2 0,-7 26 0,11-16 0,-1 66 0,4-46 0,2-50 0,0 1 0,-1 0 0,0 0 0,0 0 0,0-1 0,0 1 0,-1 0 0,0-1 0,0 0 0,0 0 0,-1 0 0,1 1 0,-1-1 0,0 0 0,-6 6 0,5-7 0,-1 1 0,0 0 0,0-1 0,-1 0 0,1-1 0,0 2 0,-1-3 0,1 2 0,-2-2 0,1 1 0,1 0 0,-13-1 0,-74 5 0,-117-9 0,104 1 0,-104-1-1365,164 2-5461</inkml:trace>
+</inkml:ink>
+</file>
+
+<file path=ppt/ink/ink5.xml><?xml version="1.0" encoding="utf-8"?>
+<inkml:ink xmlns:inkml="http://www.w3.org/2003/InkML">
+  <inkml:definitions>
+    <inkml:context xml:id="ctx0">
+      <inkml:inkSource xml:id="inkSrc0">
+        <inkml:traceFormat>
+          <inkml:channel name="X" type="integer" min="-2.14748E9" max="2.14748E9" units="cm"/>
+          <inkml:channel name="Y" type="integer" min="-2.14748E9" max="2.14748E9" units="cm"/>
+          <inkml:channel name="F" type="integer" max="32767" units="dev"/>
+        </inkml:traceFormat>
+        <inkml:channelProperties>
+          <inkml:channelProperty channel="X" name="resolution" value="1000" units="1/cm"/>
+          <inkml:channelProperty channel="Y" name="resolution" value="1000" units="1/cm"/>
+          <inkml:channelProperty channel="F" name="resolution" value="0" units="1/dev"/>
+        </inkml:channelProperties>
+      </inkml:inkSource>
+      <inkml:timestamp xml:id="ts0" timeString="2025-03-03T18:46:14.804"/>
+    </inkml:context>
+    <inkml:brush xml:id="br0">
+      <inkml:brushProperty name="width" value="0.1" units="cm"/>
+      <inkml:brushProperty name="height" value="0.1" units="cm"/>
+      <inkml:brushProperty name="color" value="#E71224"/>
+    </inkml:brush>
+  </inkml:definitions>
+  <inkml:trace contextRef="#ctx0" brushRef="#br0">28 2 24575,'-1'0'0,"1"0"0,-2-1 0,1 1 0,0 0 0,1 0 0,-1 0 0,-1 0 0,1 0 0,1 0 0,-1 1 0,0-1 0,0 0 0,0 0 0,0 1 0,0-1 0,0 0 0,0 0 0,0 1 0,1 0 0,-1-1 0,0 1 0,0 0 0,0-1 0,1 0 0,0 1 0,-1 0 0,0 0 0,1 0 0,-1-1 0,0 1 0,1 0 0,0 0 0,0 0 0,-1 0 0,1 0 0,0 0 0,0 0 0,-1 0 0,1-1 0,0 2 0,0-1 0,0 0 0,0-1 0,0 1 0,0 0 0,1 1 0,-1-2 0,1 2 0,-1 2 0,2 0 0,0 0 0,-1-1 0,1 1 0,0 0 0,1 0 0,-1-1 0,1 0 0,-1 0 0,6 5 0,22 18 0,1-1 0,2-1 0,0-1 0,1-3 0,44 21 0,3 0 0,-52-25 0,47 19 0,40 16 0,-7-2 0,-92-43 0,0 0 0,2-1 0,-1-1 0,28 2 0,141-4 0,-115-4 0,-61 3 0,1 0 0,-1 0 0,13 4 0,20 2 0,-42-7 0,-2 0 0,2 0 0,-1 1 0,1-1 0,-1 0 0,0 0 0,1 0 0,-1-1 0,0 1 0,1 0 0,-2 0 0,2 0 0,0 0 0,-2-1 0,2 0 0,-1 1 0,0-1 0,0 0 0,0 1 0,1-1 0,-2 0 0,1 0 0,1 0 0,-1 0 0,0 1 0,-1-2 0,1 1 0,0 0 0,0 0 0,0 0 0,-1-1 0,0 2 0,1-2 0,-1 1 0,1 0 0,-1 0 0,0-1 0,1 1 0,-1 0 0,0-1 0,0 1 0,0 0 0,0-1 0,0 1 0,-1-2 0,0-5 0,0-1 0,-2 1 0,1 0 0,-1-1 0,-6-10 0,-2-10 0,-2 0 0,-1 2 0,-2 0 0,-32-43 0,37 60 0,16 17 0,18 19 0,-5-11 0,-6-5 0,-1 0 0,0 2 0,0-1 0,11 16 0,-20-24 0,0 0 0,0 0 0,0 0 0,-1 1 0,1-1 0,-1 0 0,0 1 0,0-1 0,0 1 0,0 0 0,0 0 0,-1-1 0,0 1 0,0-1 0,0 1 0,0 0 0,-1-1 0,1 1 0,-1 0 0,0 0 0,0-1 0,0 0 0,-3 4 0,0 1 0,0-1 0,0-1 0,-1 2 0,-1-2 0,0 1 0,1-2 0,-1 1 0,0 0 0,-1-2 0,-7 6 0,-15 8 0,-38 17 0,4-2 0,35-16-170,-1 0-1,3 2 0,0 1 1,0 2-1,2 0 0,1 2 1,-25 31-1,32-33-6655</inkml:trace>
+</inkml:ink>
+</file>
+
+<file path=ppt/ink/ink6.xml><?xml version="1.0" encoding="utf-8"?>
+<inkml:ink xmlns:inkml="http://www.w3.org/2003/InkML">
+  <inkml:definitions>
+    <inkml:context xml:id="ctx0">
+      <inkml:inkSource xml:id="inkSrc0">
+        <inkml:traceFormat>
+          <inkml:channel name="X" type="integer" min="-2.14748E9" max="2.14748E9" units="cm"/>
+          <inkml:channel name="Y" type="integer" min="-2.14748E9" max="2.14748E9" units="cm"/>
+          <inkml:channel name="F" type="integer" max="32767" units="dev"/>
+        </inkml:traceFormat>
+        <inkml:channelProperties>
+          <inkml:channelProperty channel="X" name="resolution" value="1000" units="1/cm"/>
+          <inkml:channelProperty channel="Y" name="resolution" value="1000" units="1/cm"/>
+          <inkml:channelProperty channel="F" name="resolution" value="0" units="1/dev"/>
+        </inkml:channelProperties>
+      </inkml:inkSource>
+      <inkml:timestamp xml:id="ts0" timeString="2025-03-03T18:46:14.805"/>
+    </inkml:context>
+    <inkml:brush xml:id="br0">
+      <inkml:brushProperty name="width" value="0.1" units="cm"/>
+      <inkml:brushProperty name="height" value="0.1" units="cm"/>
+      <inkml:brushProperty name="color" value="#E71224"/>
+    </inkml:brush>
+  </inkml:definitions>
+  <inkml:trace contextRef="#ctx0" brushRef="#br0">0 1 24575,'608'37'0,"-344"-9"0,159 21 0,-329-34 0,149 46 0,82 49 0,-288-96 0,282 118 0,-152-45 0,-145-75 0,0 1 0,29 21 0,-38-22 0,1-3 0,1 1 0,0-1 0,0 0 0,1-2 0,0 0 0,26 8 0,-15-10 0,144 41 0,-68-13 0,-58-20 0,-1 2 0,1 2 0,60 33 0,-78-36 0,43 16 0,19 11 0,-30-13 0,-42-21 0,0 1 0,30 19 0,-25-10 0,2-2 0,0 0 0,0-3 0,39 17 0,-18-12 0,182 70 0,-188-68 0,-2 1 0,36 26 0,48 28 0,-32-26 0,-63-32 0,1 0 0,1-3 0,1 0 0,55 17 0,-80-29 0,0 0 0,0 0 0,0-1 0,0 0 0,0 0 0,1 0 0,-1 0 0,0 0 0,0 0 0,0-1 0,1-1 0,-1 1 0,4-2 0,-6 2 0,0 0 0,0 0 0,0-1 0,0 1 0,0-1 0,-1 0 0,1 1 0,0-1 0,-1 1 0,1-1 0,-1-1 0,0 2 0,0-2 0,1 2 0,-2-2 0,1 1 0,0 0 0,0 0 0,-1 0 0,1-1 0,-1 1 0,0 0 0,0 0 0,0-4 0,0-4 0,0 0 0,-1 0 0,-1 0 0,1 0 0,-2 0 0,-3-11 0,-27-56 0,17 42 0,6 16 0,10 20 0,0-1 0,0 0 0,0 0 0,-1 0 0,1 0 0,0 0 0,0 0 0,0 0 0,0 0 0,-1 0 0,1 0 0,0 0 0,0 0 0,0 0 0,0 1 0,0-1 0,0 0 0,-1 0 0,1 0 0,0 1 0,0-1 0,0 0 0,0 0 0,0 1 0,0-1 0,0 0 0,0 0 0,0 0 0,0 1 0,0-1 0,0 0 0,0 0 0,0 0 0,0 0 0,0 0 0,0 0 0,1 0 0,-1 1 0,0-1 0,0 0 0,0 0 0,0 0 0,0 0 0,0 1 0,1-1 0,7 42 0,-4-24 0,6 19 0,-2 0 0,-2 1 0,2 43 0,-8-78 0,0 0 0,0 0 0,-1 1 0,0-1 0,0-1 0,0 1 0,1 1 0,-1-2 0,-1 1 0,1 1 0,-1-2 0,0 0 0,1 2 0,-1-2 0,0 0 0,0 1 0,0-1 0,-1 0 0,2 0 0,-3 0 0,-2 3 0,-5 1 0,0 0 0,0 0 0,0-2 0,-15 4 0,12-3 0,-83 24 0,70-22 0,-1 0 0,2 2 0,-1 1 0,1 2 0,-35 19 0,17 1-1365,7-1-5461</inkml:trace>
+</inkml:ink>
+</file>
+
+<file path=ppt/ink/ink7.xml><?xml version="1.0" encoding="utf-8"?>
+<inkml:ink xmlns:inkml="http://www.w3.org/2003/InkML">
+  <inkml:definitions>
+    <inkml:context xml:id="ctx0">
+      <inkml:inkSource xml:id="inkSrc0">
+        <inkml:traceFormat>
+          <inkml:channel name="X" type="integer" min="-2.14748E9" max="2.14748E9" units="cm"/>
+          <inkml:channel name="Y" type="integer" min="-2.14748E9" max="2.14748E9" units="cm"/>
+          <inkml:channel name="F" type="integer" max="32767" units="dev"/>
+        </inkml:traceFormat>
+        <inkml:channelProperties>
+          <inkml:channelProperty channel="X" name="resolution" value="1000" units="1/cm"/>
+          <inkml:channelProperty channel="Y" name="resolution" value="1000" units="1/cm"/>
+          <inkml:channelProperty channel="F" name="resolution" value="0" units="1/dev"/>
+        </inkml:channelProperties>
+      </inkml:inkSource>
+      <inkml:timestamp xml:id="ts0" timeString="2025-03-03T18:47:25.129"/>
+    </inkml:context>
+    <inkml:brush xml:id="br0">
+      <inkml:brushProperty name="width" value="0.1" units="cm"/>
+      <inkml:brushProperty name="height" value="0.1" units="cm"/>
+      <inkml:brushProperty name="color" value="#E71224"/>
+    </inkml:brush>
+  </inkml:definitions>
+  <inkml:trace contextRef="#ctx0" brushRef="#br0">3268 238 24575,'-74'-22'0,"-106"-16"0,126 27 0,-474-56 0,247 38 0,95-1 0,114 15 0,-1 4 0,-124-3 0,43 15 0,-317 18 0,406-13 0,29-4 0,0 2 0,1 2 0,-46 12 0,39-7 0,-1-3 0,0-1 0,-75 3 0,86-8 0,-25 2 0,0 3 0,1 2 0,0 3 0,-60 21 0,108-30 0,0 0 0,0 0 0,1 0 0,0 1 0,-1 1 0,1-1 0,1 1 0,-1 0 0,1 1 0,0-1 0,0 1 0,-6 9 0,8-9 0,0 1 0,1-1 0,-1 1 0,2 0 0,-1 0 0,1 0 0,0 0 0,0 1 0,1-1 0,0 1 0,1-1 0,-1 0 0,2 15 0,0-8 0,1 0 0,0-1 0,0 1 0,2 0 0,0-1 0,0 0 0,1 0 0,1 0 0,0-1 0,1 0 0,0 0 0,1 0 0,0-1 0,1 0 0,0-1 0,0 1 0,1-2 0,1 0 0,0 0 0,0-1 0,1 0 0,0-1 0,19 9 0,4 0 0,-1 2 0,1-3 0,0-1 0,1-1 0,0-2 0,59 10 0,28-8 0,163 23 0,-125-13 0,178 4 0,148 17 0,-314-5 0,13 1 0,156-15 0,5-28 0,-116 1 0,-74 3 0,-8 1 0,151-17 0,-264 11 0,60-16 0,-82 15 0,0 1 0,0-2 0,0 0 0,-1-1 0,0 0 0,23-16 0,-16 8 0,43-23 0,-48 31 0,0-1 0,-1-1 0,0 0 0,-1-1 0,0 0 0,23-25 0,-29 27 0,-1-1 0,1-1 0,-1 1 0,-1-1 0,0 0 0,-1 0 0,1 0 0,-2-1 0,0 0 0,0 1 0,-1-1 0,0 0 0,-1 0 0,0 0 0,0-1 0,-2 1 0,1 0 0,-1 0 0,-1 0 0,0 0 0,-1 0 0,0 0 0,0 1 0,-1-1 0,-1 1 0,0 0 0,0 0 0,-1 1 0,0 0 0,0 0 0,-1 0 0,-1 0 0,-12-11 0,3 7 0,0 0 0,-1 2 0,-1 0 0,1 1 0,-2 1 0,-30-10 0,-125-27 0,135 37 0,-34-4-170,1 4-1,-1 3 1,-110 6-1,140 0-512,9 1-6143</inkml:trace>
+</inkml:ink>
+</file>
+
+<file path=ppt/ink/ink8.xml><?xml version="1.0" encoding="utf-8"?>
+<inkml:ink xmlns:inkml="http://www.w3.org/2003/InkML">
+  <inkml:definitions>
+    <inkml:context xml:id="ctx0">
+      <inkml:inkSource xml:id="inkSrc0">
+        <inkml:traceFormat>
+          <inkml:channel name="X" type="integer" min="-2.14748E9" max="2.14748E9" units="cm"/>
+          <inkml:channel name="Y" type="integer" min="-2.14748E9" max="2.14748E9" units="cm"/>
+          <inkml:channel name="F" type="integer" max="32767" units="dev"/>
+        </inkml:traceFormat>
+        <inkml:channelProperties>
+          <inkml:channelProperty channel="X" name="resolution" value="1000" units="1/cm"/>
+          <inkml:channelProperty channel="Y" name="resolution" value="1000" units="1/cm"/>
+          <inkml:channelProperty channel="F" name="resolution" value="0" units="1/dev"/>
+        </inkml:channelProperties>
+      </inkml:inkSource>
+      <inkml:timestamp xml:id="ts0" timeString="2025-03-03T18:47:27.009"/>
+    </inkml:context>
+    <inkml:brush xml:id="br0">
+      <inkml:brushProperty name="width" value="0.1" units="cm"/>
+      <inkml:brushProperty name="height" value="0.1" units="cm"/>
+      <inkml:brushProperty name="color" value="#E71224"/>
+    </inkml:brush>
+  </inkml:definitions>
+  <inkml:trace contextRef="#ctx0" brushRef="#br0">1889 22 24575,'0'-1'0,"0"0"0,-1 0 0,1 0 0,0 0 0,-1 0 0,1 0 0,-1 0 0,1 0 0,-1 0 0,1 1 0,-1-1 0,0 0 0,1 0 0,-1 0 0,0 1 0,0-1 0,0 0 0,1 1 0,-1-1 0,0 1 0,0-1 0,0 1 0,0-1 0,0 1 0,0 0 0,0 0 0,0-1 0,0 1 0,0 0 0,0 0 0,-2 0 0,-3-1 0,0 1 0,1 0 0,-1 0 0,0 0 0,-7 2 0,-39 12 0,0 2 0,2 3 0,-88 45 0,-18 7 0,-282 63 0,241-80 0,97-24 0,-149 67 0,71-2 0,162-86 0,-1 0 0,-27 8 0,-8 6 0,45-20 0,1-1 0,0 1 0,-1-1 0,1 0 0,-1 0 0,-7 0 0,13-1 0,0-1 0,0 0 0,0 0 0,0 0 0,-1 0 0,1 0 0,0 0 0,0-1 0,0 1 0,0 0 0,0-1 0,0 1 0,0 0 0,0-1 0,0 1 0,0-1 0,0 1 0,0-1 0,1 0 0,-1 1 0,0-1 0,0 0 0,1 0 0,-1 0 0,0 1 0,1-1 0,-1 0 0,0 0 0,1 0 0,0 0 0,-1 0 0,1 0 0,-1 0 0,1 0 0,0 0 0,0 0 0,0 0 0,0 0 0,-1-1 0,1 1 0,1 0 0,-1 0 0,0 0 0,0 0 0,0 0 0,0 0 0,1 0 0,0-2 0,1-5 0,0-1 0,0 0 0,1 0 0,1 1 0,0-1 0,0 1 0,0 0 0,8-10 0,8-9 0,24-23 0,2-3 0,-38 41 0,12-14 0,-19 24 0,0 1 0,0 0 0,0 0 0,0 1 0,0-1 0,0 0 0,0 0 0,0 0 0,1 1 0,-1-1 0,0 1 0,0-1 0,1 1 0,-1-1 0,0 1 0,0 0 0,1-1 0,1 1 0,-3 0 0,1 1 0,-1-1 0,1 0 0,0 1 0,-1-1 0,1 1 0,-1-1 0,1 1 0,-1-1 0,1 1 0,-1-1 0,1 1 0,-1-1 0,0 1 0,1 0 0,-1-1 0,0 1 0,1 0 0,-1-1 0,0 1 0,0 0 0,0-1 0,0 1 0,0 0 0,0-1 0,0 1 0,0 0 0,0 0 0,0-1 0,0 1 0,0 0 0,0-1 0,0 1 0,-1 0 0,1 0 0,-8 27 0,-1-7 0,-2 0 0,0-1 0,-26 37 0,-51 50 0,86-106 0,-1 3 0,-1 0 0,0 1 0,1 0 0,0-1 0,0 1 0,0 0 0,-2 7 0,5-11 0,-1 1 0,1 0 0,0 0 0,0-1 0,-1 1 0,1 0 0,0 0 0,0-1 0,1 1 0,-1 0 0,0 0 0,1-1 0,-1 1 0,1 0 0,-1-1 0,1 1 0,0 0 0,0-1 0,-1 1 0,1-1 0,0 1 0,0-1 0,1 0 0,-1 1 0,0-1 0,0 0 0,3 1 0,20 16 0,2-2 0,0-2 0,0 0 0,2-1 0,38 12 0,-11-4 0,52 18 24,-56-21-719,73 35 1,-90-34-6132</inkml:trace>
+</inkml:ink>
+</file>
+
+<file path=ppt/ink/ink9.xml><?xml version="1.0" encoding="utf-8"?>
+<inkml:ink xmlns:inkml="http://www.w3.org/2003/InkML">
+  <inkml:definitions>
+    <inkml:context xml:id="ctx0">
+      <inkml:inkSource xml:id="inkSrc0">
+        <inkml:traceFormat>
+          <inkml:channel name="X" type="integer" min="-2.14748E9" max="2.14748E9" units="cm"/>
+          <inkml:channel name="Y" type="integer" min="-2.14748E9" max="2.14748E9" units="cm"/>
+          <inkml:channel name="F" type="integer" max="32767" units="dev"/>
+        </inkml:traceFormat>
+        <inkml:channelProperties>
+          <inkml:channelProperty channel="X" name="resolution" value="1000" units="1/cm"/>
+          <inkml:channelProperty channel="Y" name="resolution" value="1000" units="1/cm"/>
+          <inkml:channelProperty channel="F" name="resolution" value="0" units="1/dev"/>
+        </inkml:channelProperties>
+      </inkml:inkSource>
+      <inkml:timestamp xml:id="ts0" timeString="2025-03-03T18:47:57.496"/>
+    </inkml:context>
+    <inkml:brush xml:id="br0">
+      <inkml:brushProperty name="width" value="0.1" units="cm"/>
+      <inkml:brushProperty name="height" value="0.1" units="cm"/>
+      <inkml:brushProperty name="color" value="#E71224"/>
+    </inkml:brush>
+  </inkml:definitions>
+  <inkml:trace contextRef="#ctx0" brushRef="#br0">1551 34 24575,'-1'-2'0,"0"1"0,0 0 0,1 0 0,-1 0 0,0-1 0,0 1 0,0 0 0,0 0 0,-1 0 0,1 1 0,0-1 0,0 0 0,-1 0 0,1 1 0,0-1 0,-1 0 0,1 1 0,0-1 0,-1 1 0,1 0 0,-1 0 0,1-1 0,-1 1 0,-1 0 0,-67-8 0,-1 2 0,-111 6 0,93 1 0,-93-2 0,-174 4 0,336-2 0,0 1 0,-1 1 0,1 1 0,0 1 0,0 0 0,1 2 0,0 0 0,0 1 0,-23 13 0,-20 14 0,41-25 0,2 0 0,0 2 0,0 0 0,1 1 0,0 1 0,-27 27 0,24-17 0,0 2 0,-28 45 0,43-61 0,1 1 0,0 0 0,1 0 0,0 0 0,1 1 0,0-1 0,1 1 0,0 0 0,0 0 0,2 21 0,0-16 0,2-1 0,0 0 0,1 1 0,0-1 0,2 0 0,0-1 0,0 1 0,1-1 0,1 0 0,1-1 0,0 0 0,1 0 0,0 0 0,1-1 0,1-1 0,0 0 0,1 0 0,0-1 0,0-1 0,1 0 0,1 0 0,23 12 0,12 2 0,0-2 0,2-2 0,0-2 0,1-2 0,77 12 0,45 2 0,233 25 0,174-37 0,158-2 0,-723-17 0,1 0 0,-1-1 0,0-1 0,0 0 0,0-1 0,20-9 0,84-44 0,-22 7 0,39-19 0,23-10 0,-141 70 0,0-1 0,24-16 0,-25 15 0,0 0 0,30-13 0,-42 22 0,-1 0 0,0-1 0,0 1 0,0-1 0,0 0 0,0 0 0,0-1 0,-1 1 0,0-1 0,0 0 0,0 0 0,0-1 0,0 1 0,-1-1 0,0 0 0,0 0 0,0 0 0,-1 0 0,1 0 0,-1-1 0,-1 1 0,1-1 0,-1 1 0,0-1 0,0 0 0,0 1 0,-1-1 0,0 0 0,0 0 0,-1 1 0,1-1 0,-1 0 0,0 1 0,-1-1 0,1 1 0,-1-1 0,-1 1 0,1 0 0,0-1 0,-7-8 0,-3 0 0,0 0 0,0 1 0,-2 0 0,0 1 0,0 1 0,-1 0 0,0 1 0,-1 0 0,-32-14 0,-11 1 0,-91-25 0,129 42 0,-87-26 0,-196-50 0,239 69 0,-1 2 0,-117-4 0,54 17 0,66 0 0,0-2 0,0-3 0,-72-12 0,-237-46-1365,327 56-5461</inkml:trace>
+</inkml:ink>
 </file>
 
 <file path=ppt/notesMasters/notesMaster1.xml><?xml version="1.0" encoding="utf-8"?>
@@ -551,7 +915,7 @@
               <a:pPr>
                 <a:defRPr/>
               </a:pPr>
-              <a:t>12/1/2022</a:t>
+              <a:t>3/3/2025</a:t>
             </a:fld>
             <a:endParaRPr lang="en-US"/>
           </a:p>
@@ -1570,7 +1934,7 @@
               <a:pPr>
                 <a:defRPr/>
               </a:pPr>
-              <a:t>Thursday, December 1, 2022</a:t>
+              <a:t>Monday, March 3, 2025</a:t>
             </a:fld>
             <a:endParaRPr lang="en-US"/>
           </a:p>
@@ -1753,7 +2117,7 @@
               <a:pPr>
                 <a:defRPr/>
               </a:pPr>
-              <a:t>Thursday, December 1, 2022</a:t>
+              <a:t>Monday, March 3, 2025</a:t>
             </a:fld>
             <a:endParaRPr lang="en-US"/>
           </a:p>
@@ -1946,7 +2310,7 @@
               <a:pPr>
                 <a:defRPr/>
               </a:pPr>
-              <a:t>Thursday, December 1, 2022</a:t>
+              <a:t>Monday, March 3, 2025</a:t>
             </a:fld>
             <a:endParaRPr lang="en-US"/>
           </a:p>
@@ -2129,7 +2493,7 @@
               <a:pPr>
                 <a:defRPr/>
               </a:pPr>
-              <a:t>Thursday, December 1, 2022</a:t>
+              <a:t>Monday, March 3, 2025</a:t>
             </a:fld>
             <a:endParaRPr lang="en-US"/>
           </a:p>
@@ -2389,7 +2753,7 @@
               <a:pPr>
                 <a:defRPr/>
               </a:pPr>
-              <a:t>Thursday, December 1, 2022</a:t>
+              <a:t>Monday, March 3, 2025</a:t>
             </a:fld>
             <a:endParaRPr lang="en-US"/>
           </a:p>
@@ -2689,7 +3053,7 @@
               <a:pPr>
                 <a:defRPr/>
               </a:pPr>
-              <a:t>Thursday, December 1, 2022</a:t>
+              <a:t>Monday, March 3, 2025</a:t>
             </a:fld>
             <a:endParaRPr lang="en-US"/>
           </a:p>
@@ -3123,7 +3487,7 @@
               <a:pPr>
                 <a:defRPr/>
               </a:pPr>
-              <a:t>Thursday, December 1, 2022</a:t>
+              <a:t>Monday, March 3, 2025</a:t>
             </a:fld>
             <a:endParaRPr lang="en-US"/>
           </a:p>
@@ -3255,7 +3619,7 @@
               <a:pPr>
                 <a:defRPr/>
               </a:pPr>
-              <a:t>Thursday, December 1, 2022</a:t>
+              <a:t>Monday, March 3, 2025</a:t>
             </a:fld>
             <a:endParaRPr lang="en-US"/>
           </a:p>
@@ -3365,7 +3729,7 @@
               <a:pPr>
                 <a:defRPr/>
               </a:pPr>
-              <a:t>Thursday, December 1, 2022</a:t>
+              <a:t>Monday, March 3, 2025</a:t>
             </a:fld>
             <a:endParaRPr lang="en-US"/>
           </a:p>
@@ -3655,7 +4019,7 @@
               <a:pPr>
                 <a:defRPr/>
               </a:pPr>
-              <a:t>Thursday, December 1, 2022</a:t>
+              <a:t>Monday, March 3, 2025</a:t>
             </a:fld>
             <a:endParaRPr lang="en-US"/>
           </a:p>
@@ -3922,7 +4286,7 @@
               <a:pPr>
                 <a:defRPr/>
               </a:pPr>
-              <a:t>Thursday, December 1, 2022</a:t>
+              <a:t>Monday, March 3, 2025</a:t>
             </a:fld>
             <a:endParaRPr lang="en-US"/>
           </a:p>
@@ -4148,7 +4512,7 @@
               <a:pPr>
                 <a:defRPr/>
               </a:pPr>
-              <a:t>Thursday, December 1, 2022</a:t>
+              <a:t>Monday, March 3, 2025</a:t>
             </a:fld>
             <a:endParaRPr lang="en-US"/>
           </a:p>
@@ -9259,45 +9623,30 @@
           <a:chExt cx="0" cy="0"/>
         </a:xfrm>
       </p:grpSpPr>
-      <p:sp>
-        <p:nvSpPr>
-          <p:cNvPr id="2" name="Title 1"/>
-          <p:cNvSpPr>
-            <a:spLocks noGrp="1"/>
-          </p:cNvSpPr>
-          <p:nvPr>
-            <p:ph type="title"/>
-          </p:nvPr>
-        </p:nvSpPr>
-        <p:spPr/>
-        <p:txBody>
-          <a:bodyPr/>
-          <a:lstStyle/>
-          <a:p>
-            <a:r>
-              <a:rPr lang="en-US" dirty="0"/>
-              <a:t>2D Arrays</a:t>
-            </a:r>
-          </a:p>
-        </p:txBody>
-      </p:sp>
       <p:pic>
         <p:nvPicPr>
-          <p:cNvPr id="4" name="Picture 3"/>
+          <p:cNvPr id="36" name="Picture 35">
+            <a:extLst>
+              <a:ext uri="{FF2B5EF4-FFF2-40B4-BE49-F238E27FC236}">
+                <a16:creationId xmlns:a16="http://schemas.microsoft.com/office/drawing/2014/main" id="{FA8E5309-6860-9894-43CF-83BFED8B2AAE}"/>
+              </a:ext>
+            </a:extLst>
+          </p:cNvPr>
           <p:cNvPicPr>
             <a:picLocks noChangeAspect="1"/>
           </p:cNvPicPr>
           <p:nvPr/>
         </p:nvPicPr>
-        <p:blipFill rotWithShape="1">
+        <p:blipFill>
           <a:blip r:embed="rId3"/>
-          <a:srcRect l="1173"/>
-          <a:stretch/>
+          <a:stretch>
+            <a:fillRect/>
+          </a:stretch>
         </p:blipFill>
         <p:spPr>
           <a:xfrm>
-            <a:off x="152400" y="1199269"/>
-            <a:ext cx="4343400" cy="2920087"/>
+            <a:off x="349590" y="5265756"/>
+            <a:ext cx="6525536" cy="1390844"/>
           </a:xfrm>
           <a:prstGeom prst="rect">
             <a:avLst/>
@@ -9306,21 +9655,27 @@
       </p:pic>
       <p:pic>
         <p:nvPicPr>
-          <p:cNvPr id="5" name="Picture 4"/>
+          <p:cNvPr id="32" name="Picture 31">
+            <a:extLst>
+              <a:ext uri="{FF2B5EF4-FFF2-40B4-BE49-F238E27FC236}">
+                <a16:creationId xmlns:a16="http://schemas.microsoft.com/office/drawing/2014/main" id="{2254E783-570F-231A-D52B-CDC6B6266488}"/>
+              </a:ext>
+            </a:extLst>
+          </p:cNvPr>
           <p:cNvPicPr>
             <a:picLocks noChangeAspect="1"/>
           </p:cNvPicPr>
           <p:nvPr/>
         </p:nvPicPr>
-        <p:blipFill rotWithShape="1">
+        <p:blipFill>
           <a:blip r:embed="rId4"/>
-          <a:srcRect l="24800" t="35443" r="25138"/>
+          <a:srcRect r="1737"/>
           <a:stretch/>
         </p:blipFill>
         <p:spPr>
           <a:xfrm>
-            <a:off x="450574" y="4572984"/>
-            <a:ext cx="4045226" cy="2022612"/>
+            <a:off x="249371" y="2014368"/>
+            <a:ext cx="5593944" cy="1479448"/>
           </a:xfrm>
           <a:prstGeom prst="rect">
             <a:avLst/>
@@ -9329,7 +9684,13 @@
       </p:pic>
       <p:pic>
         <p:nvPicPr>
-          <p:cNvPr id="6" name="Picture 5"/>
+          <p:cNvPr id="19" name="Picture 18">
+            <a:extLst>
+              <a:ext uri="{FF2B5EF4-FFF2-40B4-BE49-F238E27FC236}">
+                <a16:creationId xmlns:a16="http://schemas.microsoft.com/office/drawing/2014/main" id="{E13B3A15-BBEA-0D1B-DAD4-E9F4F8404DE9}"/>
+              </a:ext>
+            </a:extLst>
+          </p:cNvPr>
           <p:cNvPicPr>
             <a:picLocks noChangeAspect="1"/>
           </p:cNvPicPr>
@@ -9343,8 +9704,8 @@
         </p:blipFill>
         <p:spPr>
           <a:xfrm>
-            <a:off x="5410200" y="2203001"/>
-            <a:ext cx="3419475" cy="1752600"/>
+            <a:off x="249371" y="3597678"/>
+            <a:ext cx="4540453" cy="1564216"/>
           </a:xfrm>
           <a:prstGeom prst="rect">
             <a:avLst/>
@@ -9353,7 +9714,13 @@
       </p:pic>
       <p:pic>
         <p:nvPicPr>
-          <p:cNvPr id="7" name="Picture 6"/>
+          <p:cNvPr id="18" name="Picture 17">
+            <a:extLst>
+              <a:ext uri="{FF2B5EF4-FFF2-40B4-BE49-F238E27FC236}">
+                <a16:creationId xmlns:a16="http://schemas.microsoft.com/office/drawing/2014/main" id="{6791893A-0A51-C8C0-4B30-E240DB6F6E19}"/>
+              </a:ext>
+            </a:extLst>
+          </p:cNvPr>
           <p:cNvPicPr>
             <a:picLocks noChangeAspect="1"/>
           </p:cNvPicPr>
@@ -9367,140 +9734,368 @@
         </p:blipFill>
         <p:spPr>
           <a:xfrm>
-            <a:off x="5914197" y="4954552"/>
-            <a:ext cx="2667000" cy="1338988"/>
+            <a:off x="249371" y="325316"/>
+            <a:ext cx="5593944" cy="1638445"/>
           </a:xfrm>
           <a:prstGeom prst="rect">
             <a:avLst/>
           </a:prstGeom>
         </p:spPr>
-        <p:style>
-          <a:lnRef idx="3">
-            <a:schemeClr val="lt1"/>
-          </a:lnRef>
-          <a:fillRef idx="1">
-            <a:schemeClr val="accent1"/>
-          </a:fillRef>
-          <a:effectRef idx="1">
-            <a:schemeClr val="accent1"/>
-          </a:effectRef>
-          <a:fontRef idx="minor">
-            <a:schemeClr val="lt1"/>
-          </a:fontRef>
-        </p:style>
       </p:pic>
-      <p:pic>
-        <p:nvPicPr>
-          <p:cNvPr id="9" name="Picture 8"/>
-          <p:cNvPicPr>
-            <a:picLocks noChangeAspect="1"/>
-          </p:cNvPicPr>
+      <p:grpSp>
+        <p:nvGrpSpPr>
+          <p:cNvPr id="20" name="Group 19">
+            <a:extLst>
+              <a:ext uri="{FF2B5EF4-FFF2-40B4-BE49-F238E27FC236}">
+                <a16:creationId xmlns:a16="http://schemas.microsoft.com/office/drawing/2014/main" id="{77CFCB67-705E-1283-BB84-6E2889113FD6}"/>
+              </a:ext>
+            </a:extLst>
+          </p:cNvPr>
+          <p:cNvGrpSpPr/>
           <p:nvPr/>
-        </p:nvPicPr>
-        <p:blipFill rotWithShape="1">
-          <a:blip r:embed="rId3"/>
-          <a:srcRect l="1173"/>
-          <a:stretch/>
-        </p:blipFill>
-        <p:spPr>
-          <a:xfrm>
-            <a:off x="168965" y="1199269"/>
-            <a:ext cx="4343400" cy="2920087"/>
-          </a:xfrm>
-          <a:prstGeom prst="rect">
-            <a:avLst/>
-          </a:prstGeom>
-        </p:spPr>
-        <p:style>
-          <a:lnRef idx="3">
-            <a:schemeClr val="lt1"/>
-          </a:lnRef>
-          <a:fillRef idx="1">
-            <a:schemeClr val="accent1"/>
-          </a:fillRef>
-          <a:effectRef idx="1">
-            <a:schemeClr val="accent1"/>
-          </a:effectRef>
-          <a:fontRef idx="minor">
-            <a:schemeClr val="lt1"/>
-          </a:fontRef>
-        </p:style>
-      </p:pic>
-      <p:pic>
-        <p:nvPicPr>
-          <p:cNvPr id="10" name="Picture 9"/>
-          <p:cNvPicPr>
-            <a:picLocks noChangeAspect="1"/>
-          </p:cNvPicPr>
-          <p:nvPr/>
-        </p:nvPicPr>
-        <p:blipFill rotWithShape="1">
-          <a:blip r:embed="rId4"/>
-          <a:srcRect l="24800" t="35443" r="25138"/>
-          <a:stretch/>
-        </p:blipFill>
-        <p:spPr>
-          <a:xfrm>
-            <a:off x="467139" y="4572984"/>
-            <a:ext cx="4045226" cy="2022612"/>
-          </a:xfrm>
-          <a:prstGeom prst="rect">
-            <a:avLst/>
-          </a:prstGeom>
-        </p:spPr>
-        <p:style>
-          <a:lnRef idx="3">
-            <a:schemeClr val="lt1"/>
-          </a:lnRef>
-          <a:fillRef idx="1">
-            <a:schemeClr val="accent1"/>
-          </a:fillRef>
-          <a:effectRef idx="1">
-            <a:schemeClr val="accent1"/>
-          </a:effectRef>
-          <a:fontRef idx="minor">
-            <a:schemeClr val="lt1"/>
-          </a:fontRef>
-        </p:style>
-      </p:pic>
-      <p:pic>
-        <p:nvPicPr>
-          <p:cNvPr id="11" name="Picture 10"/>
-          <p:cNvPicPr>
-            <a:picLocks noChangeAspect="1"/>
-          </p:cNvPicPr>
-          <p:nvPr/>
-        </p:nvPicPr>
-        <p:blipFill>
-          <a:blip r:embed="rId5"/>
-          <a:stretch>
-            <a:fillRect/>
-          </a:stretch>
-        </p:blipFill>
-        <p:spPr>
-          <a:xfrm>
-            <a:off x="5426765" y="2203001"/>
-            <a:ext cx="3419475" cy="1752600"/>
-          </a:xfrm>
-          <a:prstGeom prst="rect">
-            <a:avLst/>
-          </a:prstGeom>
-        </p:spPr>
-        <p:style>
-          <a:lnRef idx="3">
-            <a:schemeClr val="lt1"/>
-          </a:lnRef>
-          <a:fillRef idx="1">
-            <a:schemeClr val="accent1"/>
-          </a:fillRef>
-          <a:effectRef idx="1">
-            <a:schemeClr val="accent1"/>
-          </a:effectRef>
-          <a:fontRef idx="minor">
-            <a:schemeClr val="lt1"/>
-          </a:fontRef>
-        </p:style>
-      </p:pic>
+        </p:nvGrpSpPr>
+        <p:grpSpPr>
+          <a:xfrm>
+            <a:off x="95586" y="193444"/>
+            <a:ext cx="5617145" cy="1597595"/>
+            <a:chOff x="416382" y="1239860"/>
+            <a:chExt cx="6961680" cy="1980000"/>
+          </a:xfrm>
+        </p:grpSpPr>
+        <mc:AlternateContent xmlns:mc="http://schemas.openxmlformats.org/markup-compatibility/2006" xmlns:p14="http://schemas.microsoft.com/office/powerpoint/2010/main">
+          <mc:Choice Requires="p14">
+            <p:contentPart p14:bwMode="auto" r:id="rId7">
+              <p14:nvContentPartPr>
+                <p14:cNvPr id="21" name="Ink 20">
+                  <a:extLst>
+                    <a:ext uri="{FF2B5EF4-FFF2-40B4-BE49-F238E27FC236}">
+                      <a16:creationId xmlns:a16="http://schemas.microsoft.com/office/drawing/2014/main" id="{504C60A2-EF43-48D0-3C46-4A5A5579EE87}"/>
+                    </a:ext>
+                  </a:extLst>
+                </p14:cNvPr>
+                <p14:cNvContentPartPr/>
+                <p14:nvPr/>
+              </p14:nvContentPartPr>
+              <p14:xfrm>
+                <a:off x="6123822" y="2967500"/>
+                <a:ext cx="1254240" cy="252360"/>
+              </p14:xfrm>
+            </p:contentPart>
+          </mc:Choice>
+          <mc:Fallback xmlns="">
+            <p:pic>
+              <p:nvPicPr>
+                <p:cNvPr id="14" name="Ink 13">
+                  <a:extLst>
+                    <a:ext uri="{FF2B5EF4-FFF2-40B4-BE49-F238E27FC236}">
+                      <a16:creationId xmlns:a16="http://schemas.microsoft.com/office/drawing/2014/main" id="{FE6F3246-36FC-8842-DE28-D610E0AC3921}"/>
+                    </a:ext>
+                  </a:extLst>
+                </p:cNvPr>
+                <p:cNvPicPr/>
+                <p:nvPr/>
+              </p:nvPicPr>
+              <p:blipFill>
+                <a:blip r:embed="rId14"/>
+                <a:stretch>
+                  <a:fillRect/>
+                </a:stretch>
+              </p:blipFill>
+              <p:spPr>
+                <a:xfrm>
+                  <a:off x="6105822" y="2949500"/>
+                  <a:ext cx="1289880" cy="288000"/>
+                </a:xfrm>
+                <a:prstGeom prst="rect">
+                  <a:avLst/>
+                </a:prstGeom>
+              </p:spPr>
+            </p:pic>
+          </mc:Fallback>
+        </mc:AlternateContent>
+        <mc:AlternateContent xmlns:mc="http://schemas.openxmlformats.org/markup-compatibility/2006" xmlns:p14="http://schemas.microsoft.com/office/powerpoint/2010/main">
+          <mc:Choice Requires="p14">
+            <p:contentPart p14:bwMode="auto" r:id="rId15">
+              <p14:nvContentPartPr>
+                <p14:cNvPr id="22" name="Ink 21">
+                  <a:extLst>
+                    <a:ext uri="{FF2B5EF4-FFF2-40B4-BE49-F238E27FC236}">
+                      <a16:creationId xmlns:a16="http://schemas.microsoft.com/office/drawing/2014/main" id="{A5BFD595-B0E2-3AB1-E205-A29B7A2D7A47}"/>
+                    </a:ext>
+                  </a:extLst>
+                </p14:cNvPr>
+                <p14:cNvContentPartPr/>
+                <p14:nvPr/>
+              </p14:nvContentPartPr>
+              <p14:xfrm>
+                <a:off x="898782" y="1476740"/>
+                <a:ext cx="2082960" cy="428040"/>
+              </p14:xfrm>
+            </p:contentPart>
+          </mc:Choice>
+          <mc:Fallback xmlns="">
+            <p:pic>
+              <p:nvPicPr>
+                <p:cNvPr id="12" name="Ink 11">
+                  <a:extLst>
+                    <a:ext uri="{FF2B5EF4-FFF2-40B4-BE49-F238E27FC236}">
+                      <a16:creationId xmlns:a16="http://schemas.microsoft.com/office/drawing/2014/main" id="{CEC72E92-E962-AE4C-9FFB-A3E33C7777A0}"/>
+                    </a:ext>
+                  </a:extLst>
+                </p:cNvPr>
+                <p:cNvPicPr/>
+                <p:nvPr/>
+              </p:nvPicPr>
+              <p:blipFill>
+                <a:blip r:embed="rId16"/>
+                <a:stretch>
+                  <a:fillRect/>
+                </a:stretch>
+              </p:blipFill>
+              <p:spPr>
+                <a:xfrm>
+                  <a:off x="881142" y="1458740"/>
+                  <a:ext cx="2118600" cy="463680"/>
+                </a:xfrm>
+                <a:prstGeom prst="rect">
+                  <a:avLst/>
+                </a:prstGeom>
+              </p:spPr>
+            </p:pic>
+          </mc:Fallback>
+        </mc:AlternateContent>
+        <mc:AlternateContent xmlns:mc="http://schemas.openxmlformats.org/markup-compatibility/2006" xmlns:p14="http://schemas.microsoft.com/office/powerpoint/2010/main">
+          <mc:Choice Requires="p14">
+            <p:contentPart p14:bwMode="auto" r:id="rId17">
+              <p14:nvContentPartPr>
+                <p14:cNvPr id="23" name="Ink 22">
+                  <a:extLst>
+                    <a:ext uri="{FF2B5EF4-FFF2-40B4-BE49-F238E27FC236}">
+                      <a16:creationId xmlns:a16="http://schemas.microsoft.com/office/drawing/2014/main" id="{3BC9D956-B6B1-2253-6FF1-0DB30280CE5F}"/>
+                    </a:ext>
+                  </a:extLst>
+                </p14:cNvPr>
+                <p14:cNvContentPartPr/>
+                <p14:nvPr/>
+              </p14:nvContentPartPr>
+              <p14:xfrm>
+                <a:off x="3065262" y="2128340"/>
+                <a:ext cx="864360" cy="315360"/>
+              </p14:xfrm>
+            </p:contentPart>
+          </mc:Choice>
+          <mc:Fallback xmlns="">
+            <p:pic>
+              <p:nvPicPr>
+                <p:cNvPr id="13" name="Ink 12">
+                  <a:extLst>
+                    <a:ext uri="{FF2B5EF4-FFF2-40B4-BE49-F238E27FC236}">
+                      <a16:creationId xmlns:a16="http://schemas.microsoft.com/office/drawing/2014/main" id="{C99E84F6-4AE1-5072-1F31-C42765810F4E}"/>
+                    </a:ext>
+                  </a:extLst>
+                </p:cNvPr>
+                <p:cNvPicPr/>
+                <p:nvPr/>
+              </p:nvPicPr>
+              <p:blipFill>
+                <a:blip r:embed="rId18"/>
+                <a:stretch>
+                  <a:fillRect/>
+                </a:stretch>
+              </p:blipFill>
+              <p:spPr>
+                <a:xfrm>
+                  <a:off x="3047622" y="2110700"/>
+                  <a:ext cx="900000" cy="351000"/>
+                </a:xfrm>
+                <a:prstGeom prst="rect">
+                  <a:avLst/>
+                </a:prstGeom>
+              </p:spPr>
+            </p:pic>
+          </mc:Fallback>
+        </mc:AlternateContent>
+        <mc:AlternateContent xmlns:mc="http://schemas.openxmlformats.org/markup-compatibility/2006" xmlns:p14="http://schemas.microsoft.com/office/powerpoint/2010/main">
+          <mc:Choice Requires="p14">
+            <p:contentPart p14:bwMode="auto" r:id="rId19">
+              <p14:nvContentPartPr>
+                <p14:cNvPr id="24" name="Ink 23">
+                  <a:extLst>
+                    <a:ext uri="{FF2B5EF4-FFF2-40B4-BE49-F238E27FC236}">
+                      <a16:creationId xmlns:a16="http://schemas.microsoft.com/office/drawing/2014/main" id="{3B266810-2A66-0A07-5797-93CC9C0CA859}"/>
+                    </a:ext>
+                  </a:extLst>
+                </p14:cNvPr>
+                <p14:cNvContentPartPr/>
+                <p14:nvPr/>
+              </p14:nvContentPartPr>
+              <p14:xfrm>
+                <a:off x="416382" y="1239860"/>
+                <a:ext cx="371520" cy="304920"/>
+              </p14:xfrm>
+            </p:contentPart>
+          </mc:Choice>
+          <mc:Fallback xmlns="">
+            <p:pic>
+              <p:nvPicPr>
+                <p:cNvPr id="21" name="Ink 20">
+                  <a:extLst>
+                    <a:ext uri="{FF2B5EF4-FFF2-40B4-BE49-F238E27FC236}">
+                      <a16:creationId xmlns:a16="http://schemas.microsoft.com/office/drawing/2014/main" id="{B2D1CD07-194B-21B2-161A-CF88F5612646}"/>
+                    </a:ext>
+                  </a:extLst>
+                </p:cNvPr>
+                <p:cNvPicPr/>
+                <p:nvPr/>
+              </p:nvPicPr>
+              <p:blipFill>
+                <a:blip r:embed="rId20"/>
+                <a:stretch>
+                  <a:fillRect/>
+                </a:stretch>
+              </p:blipFill>
+              <p:spPr>
+                <a:xfrm>
+                  <a:off x="398742" y="1222220"/>
+                  <a:ext cx="407160" cy="340560"/>
+                </a:xfrm>
+                <a:prstGeom prst="rect">
+                  <a:avLst/>
+                </a:prstGeom>
+              </p:spPr>
+            </p:pic>
+          </mc:Fallback>
+        </mc:AlternateContent>
+        <mc:AlternateContent xmlns:mc="http://schemas.openxmlformats.org/markup-compatibility/2006" xmlns:p14="http://schemas.microsoft.com/office/powerpoint/2010/main">
+          <mc:Choice Requires="p14">
+            <p:contentPart p14:bwMode="auto" r:id="rId21">
+              <p14:nvContentPartPr>
+                <p14:cNvPr id="25" name="Ink 24">
+                  <a:extLst>
+                    <a:ext uri="{FF2B5EF4-FFF2-40B4-BE49-F238E27FC236}">
+                      <a16:creationId xmlns:a16="http://schemas.microsoft.com/office/drawing/2014/main" id="{82FA1CB7-0737-2B34-A8E7-1FE2C28DB525}"/>
+                    </a:ext>
+                  </a:extLst>
+                </p14:cNvPr>
+                <p14:cNvContentPartPr/>
+                <p14:nvPr/>
+              </p14:nvContentPartPr>
+              <p14:xfrm>
+                <a:off x="2404662" y="1953020"/>
+                <a:ext cx="533880" cy="339120"/>
+              </p14:xfrm>
+            </p:contentPart>
+          </mc:Choice>
+          <mc:Fallback xmlns="">
+            <p:pic>
+              <p:nvPicPr>
+                <p:cNvPr id="22" name="Ink 21">
+                  <a:extLst>
+                    <a:ext uri="{FF2B5EF4-FFF2-40B4-BE49-F238E27FC236}">
+                      <a16:creationId xmlns:a16="http://schemas.microsoft.com/office/drawing/2014/main" id="{82A460E9-2B94-46FB-F332-96F1A79365E3}"/>
+                    </a:ext>
+                  </a:extLst>
+                </p:cNvPr>
+                <p:cNvPicPr/>
+                <p:nvPr/>
+              </p:nvPicPr>
+              <p:blipFill>
+                <a:blip r:embed="rId22"/>
+                <a:stretch>
+                  <a:fillRect/>
+                </a:stretch>
+              </p:blipFill>
+              <p:spPr>
+                <a:xfrm>
+                  <a:off x="2386662" y="1935380"/>
+                  <a:ext cx="569520" cy="374760"/>
+                </a:xfrm>
+                <a:prstGeom prst="rect">
+                  <a:avLst/>
+                </a:prstGeom>
+              </p:spPr>
+            </p:pic>
+          </mc:Fallback>
+        </mc:AlternateContent>
+        <mc:AlternateContent xmlns:mc="http://schemas.openxmlformats.org/markup-compatibility/2006" xmlns:p14="http://schemas.microsoft.com/office/powerpoint/2010/main">
+          <mc:Choice Requires="p14">
+            <p:contentPart p14:bwMode="auto" r:id="rId23">
+              <p14:nvContentPartPr>
+                <p14:cNvPr id="26" name="Ink 25">
+                  <a:extLst>
+                    <a:ext uri="{FF2B5EF4-FFF2-40B4-BE49-F238E27FC236}">
+                      <a16:creationId xmlns:a16="http://schemas.microsoft.com/office/drawing/2014/main" id="{CA28B9FD-FCA0-2C5B-9448-72EE9E2E0550}"/>
+                    </a:ext>
+                  </a:extLst>
+                </p14:cNvPr>
+                <p14:cNvContentPartPr/>
+                <p14:nvPr/>
+              </p14:nvContentPartPr>
+              <p14:xfrm>
+                <a:off x="3982902" y="2329220"/>
+                <a:ext cx="2079720" cy="781200"/>
+              </p14:xfrm>
+            </p:contentPart>
+          </mc:Choice>
+          <mc:Fallback xmlns="">
+            <p:pic>
+              <p:nvPicPr>
+                <p:cNvPr id="24" name="Ink 23">
+                  <a:extLst>
+                    <a:ext uri="{FF2B5EF4-FFF2-40B4-BE49-F238E27FC236}">
+                      <a16:creationId xmlns:a16="http://schemas.microsoft.com/office/drawing/2014/main" id="{7F679FD8-822F-950E-B3FC-7222C88621A4}"/>
+                    </a:ext>
+                  </a:extLst>
+                </p:cNvPr>
+                <p:cNvPicPr/>
+                <p:nvPr/>
+              </p:nvPicPr>
+              <p:blipFill>
+                <a:blip r:embed="rId24"/>
+                <a:stretch>
+                  <a:fillRect/>
+                </a:stretch>
+              </p:blipFill>
+              <p:spPr>
+                <a:xfrm>
+                  <a:off x="3964902" y="2311580"/>
+                  <a:ext cx="2115360" cy="816840"/>
+                </a:xfrm>
+                <a:prstGeom prst="rect">
+                  <a:avLst/>
+                </a:prstGeom>
+              </p:spPr>
+            </p:pic>
+          </mc:Fallback>
+        </mc:AlternateContent>
+      </p:grpSp>
+      <p:sp>
+        <p:nvSpPr>
+          <p:cNvPr id="2" name="Title 1"/>
+          <p:cNvSpPr>
+            <a:spLocks noGrp="1"/>
+          </p:cNvSpPr>
+          <p:nvPr>
+            <p:ph type="title"/>
+          </p:nvPr>
+        </p:nvSpPr>
+        <p:spPr>
+          <a:xfrm>
+            <a:off x="5701237" y="17346"/>
+            <a:ext cx="3358055" cy="1143000"/>
+          </a:xfrm>
+        </p:spPr>
+        <p:txBody>
+          <a:bodyPr/>
+          <a:lstStyle/>
+          <a:p>
+            <a:r>
+              <a:rPr lang="en-US" dirty="0"/>
+              <a:t>2D Arrays</a:t>
+            </a:r>
+          </a:p>
+        </p:txBody>
+      </p:sp>
       <p:sp>
         <p:nvSpPr>
           <p:cNvPr id="12" name="Rectangle 11"/>
@@ -9509,7 +10104,7 @@
         </p:nvSpPr>
         <p:spPr>
           <a:xfrm>
-            <a:off x="2456849" y="2029601"/>
+            <a:off x="2706220" y="937279"/>
             <a:ext cx="569387" cy="923330"/>
           </a:xfrm>
           <a:prstGeom prst="rect">
@@ -9553,7 +10148,7 @@
         </p:nvSpPr>
         <p:spPr>
           <a:xfrm>
-            <a:off x="2893942" y="5162381"/>
+            <a:off x="2316654" y="2596190"/>
             <a:ext cx="569387" cy="923330"/>
           </a:xfrm>
           <a:prstGeom prst="rect">
@@ -9597,7 +10192,7 @@
         </p:nvSpPr>
         <p:spPr>
           <a:xfrm>
-            <a:off x="6783684" y="2520367"/>
+            <a:off x="2608893" y="3951291"/>
             <a:ext cx="569387" cy="923330"/>
           </a:xfrm>
           <a:prstGeom prst="rect">
@@ -9641,7 +10236,7 @@
         </p:nvSpPr>
         <p:spPr>
           <a:xfrm>
-            <a:off x="6963002" y="4700716"/>
+            <a:off x="2706219" y="5733270"/>
             <a:ext cx="569388" cy="923330"/>
           </a:xfrm>
           <a:prstGeom prst="rect">
@@ -9677,6 +10272,405 @@
           </a:p>
         </p:txBody>
       </p:sp>
+      <p:grpSp>
+        <p:nvGrpSpPr>
+          <p:cNvPr id="31" name="Group 30">
+            <a:extLst>
+              <a:ext uri="{FF2B5EF4-FFF2-40B4-BE49-F238E27FC236}">
+                <a16:creationId xmlns:a16="http://schemas.microsoft.com/office/drawing/2014/main" id="{52408083-FA85-1B36-899F-836E48B9D93C}"/>
+              </a:ext>
+            </a:extLst>
+          </p:cNvPr>
+          <p:cNvGrpSpPr/>
+          <p:nvPr/>
+        </p:nvGrpSpPr>
+        <p:grpSpPr>
+          <a:xfrm>
+            <a:off x="349590" y="4473949"/>
+            <a:ext cx="2248920" cy="514440"/>
+            <a:chOff x="4551575" y="4269625"/>
+            <a:chExt cx="2248920" cy="514440"/>
+          </a:xfrm>
+        </p:grpSpPr>
+        <mc:AlternateContent xmlns:mc="http://schemas.openxmlformats.org/markup-compatibility/2006">
+          <mc:Choice xmlns:p14="http://schemas.microsoft.com/office/powerpoint/2010/main" Requires="p14">
+            <p:contentPart p14:bwMode="auto" r:id="rId25">
+              <p14:nvContentPartPr>
+                <p14:cNvPr id="29" name="Ink 28">
+                  <a:extLst>
+                    <a:ext uri="{FF2B5EF4-FFF2-40B4-BE49-F238E27FC236}">
+                      <a16:creationId xmlns:a16="http://schemas.microsoft.com/office/drawing/2014/main" id="{75B3E00F-1242-D8C0-99B8-413C80767A03}"/>
+                    </a:ext>
+                  </a:extLst>
+                </p14:cNvPr>
+                <p14:cNvContentPartPr/>
+                <p14:nvPr/>
+              </p14:nvContentPartPr>
+              <p14:xfrm>
+                <a:off x="4551575" y="4433785"/>
+                <a:ext cx="1545480" cy="350280"/>
+              </p14:xfrm>
+            </p:contentPart>
+          </mc:Choice>
+          <mc:Fallback>
+            <p:pic>
+              <p:nvPicPr>
+                <p:cNvPr id="29" name="Ink 28">
+                  <a:extLst>
+                    <a:ext uri="{FF2B5EF4-FFF2-40B4-BE49-F238E27FC236}">
+                      <a16:creationId xmlns:a16="http://schemas.microsoft.com/office/drawing/2014/main" id="{75B3E00F-1242-D8C0-99B8-413C80767A03}"/>
+                    </a:ext>
+                  </a:extLst>
+                </p:cNvPr>
+                <p:cNvPicPr/>
+                <p:nvPr/>
+              </p:nvPicPr>
+              <p:blipFill>
+                <a:blip r:embed="rId26"/>
+                <a:stretch>
+                  <a:fillRect/>
+                </a:stretch>
+              </p:blipFill>
+              <p:spPr>
+                <a:xfrm>
+                  <a:off x="4533575" y="4416145"/>
+                  <a:ext cx="1581120" cy="385920"/>
+                </a:xfrm>
+                <a:prstGeom prst="rect">
+                  <a:avLst/>
+                </a:prstGeom>
+              </p:spPr>
+            </p:pic>
+          </mc:Fallback>
+        </mc:AlternateContent>
+        <mc:AlternateContent xmlns:mc="http://schemas.openxmlformats.org/markup-compatibility/2006">
+          <mc:Choice xmlns:p14="http://schemas.microsoft.com/office/powerpoint/2010/main" Requires="p14">
+            <p:contentPart p14:bwMode="auto" r:id="rId27">
+              <p14:nvContentPartPr>
+                <p14:cNvPr id="30" name="Ink 29">
+                  <a:extLst>
+                    <a:ext uri="{FF2B5EF4-FFF2-40B4-BE49-F238E27FC236}">
+                      <a16:creationId xmlns:a16="http://schemas.microsoft.com/office/drawing/2014/main" id="{5032776E-90C6-493E-02E1-53892454E82B}"/>
+                    </a:ext>
+                  </a:extLst>
+                </p14:cNvPr>
+                <p14:cNvContentPartPr/>
+                <p14:nvPr/>
+              </p14:nvContentPartPr>
+              <p14:xfrm>
+                <a:off x="6120095" y="4269625"/>
+                <a:ext cx="680400" cy="354960"/>
+              </p14:xfrm>
+            </p:contentPart>
+          </mc:Choice>
+          <mc:Fallback>
+            <p:pic>
+              <p:nvPicPr>
+                <p:cNvPr id="30" name="Ink 29">
+                  <a:extLst>
+                    <a:ext uri="{FF2B5EF4-FFF2-40B4-BE49-F238E27FC236}">
+                      <a16:creationId xmlns:a16="http://schemas.microsoft.com/office/drawing/2014/main" id="{5032776E-90C6-493E-02E1-53892454E82B}"/>
+                    </a:ext>
+                  </a:extLst>
+                </p:cNvPr>
+                <p:cNvPicPr/>
+                <p:nvPr/>
+              </p:nvPicPr>
+              <p:blipFill>
+                <a:blip r:embed="rId28"/>
+                <a:stretch>
+                  <a:fillRect/>
+                </a:stretch>
+              </p:blipFill>
+              <p:spPr>
+                <a:xfrm>
+                  <a:off x="6102095" y="4251985"/>
+                  <a:ext cx="716040" cy="390600"/>
+                </a:xfrm>
+                <a:prstGeom prst="rect">
+                  <a:avLst/>
+                </a:prstGeom>
+              </p:spPr>
+            </p:pic>
+          </mc:Fallback>
+        </mc:AlternateContent>
+      </p:grpSp>
+      <mc:AlternateContent xmlns:mc="http://schemas.openxmlformats.org/markup-compatibility/2006">
+        <mc:Choice xmlns:p14="http://schemas.microsoft.com/office/powerpoint/2010/main" Requires="p14">
+          <p:contentPart p14:bwMode="auto" r:id="rId29">
+            <p14:nvContentPartPr>
+              <p14:cNvPr id="33" name="Ink 32">
+                <a:extLst>
+                  <a:ext uri="{FF2B5EF4-FFF2-40B4-BE49-F238E27FC236}">
+                    <a16:creationId xmlns:a16="http://schemas.microsoft.com/office/drawing/2014/main" id="{07D93812-EBA7-952C-3387-1F2B6CB83A51}"/>
+                  </a:ext>
+                </a:extLst>
+              </p14:cNvPr>
+              <p14:cNvContentPartPr/>
+              <p14:nvPr/>
+            </p14:nvContentPartPr>
+            <p14:xfrm>
+              <a:off x="3494040" y="2267991"/>
+              <a:ext cx="1221120" cy="379800"/>
+            </p14:xfrm>
+          </p:contentPart>
+        </mc:Choice>
+        <mc:Fallback>
+          <p:pic>
+            <p:nvPicPr>
+              <p:cNvPr id="33" name="Ink 32">
+                <a:extLst>
+                  <a:ext uri="{FF2B5EF4-FFF2-40B4-BE49-F238E27FC236}">
+                    <a16:creationId xmlns:a16="http://schemas.microsoft.com/office/drawing/2014/main" id="{07D93812-EBA7-952C-3387-1F2B6CB83A51}"/>
+                  </a:ext>
+                </a:extLst>
+              </p:cNvPr>
+              <p:cNvPicPr/>
+              <p:nvPr/>
+            </p:nvPicPr>
+            <p:blipFill>
+              <a:blip r:embed="rId30"/>
+              <a:stretch>
+                <a:fillRect/>
+              </a:stretch>
+            </p:blipFill>
+            <p:spPr>
+              <a:xfrm>
+                <a:off x="3476400" y="2250351"/>
+                <a:ext cx="1256760" cy="415440"/>
+              </a:xfrm>
+              <a:prstGeom prst="rect">
+                <a:avLst/>
+              </a:prstGeom>
+            </p:spPr>
+          </p:pic>
+        </mc:Fallback>
+      </mc:AlternateContent>
+      <mc:AlternateContent xmlns:mc="http://schemas.openxmlformats.org/markup-compatibility/2006">
+        <mc:Choice xmlns:p14="http://schemas.microsoft.com/office/powerpoint/2010/main" Requires="p14">
+          <p:contentPart p14:bwMode="auto" r:id="rId31">
+            <p14:nvContentPartPr>
+              <p14:cNvPr id="34" name="Ink 33">
+                <a:extLst>
+                  <a:ext uri="{FF2B5EF4-FFF2-40B4-BE49-F238E27FC236}">
+                    <a16:creationId xmlns:a16="http://schemas.microsoft.com/office/drawing/2014/main" id="{04106AAE-C853-E672-B5DF-97DFAF660C13}"/>
+                  </a:ext>
+                </a:extLst>
+              </p14:cNvPr>
+              <p14:cNvContentPartPr/>
+              <p14:nvPr/>
+            </p14:nvContentPartPr>
+            <p14:xfrm>
+              <a:off x="2969520" y="2475711"/>
+              <a:ext cx="482760" cy="382680"/>
+            </p14:xfrm>
+          </p:contentPart>
+        </mc:Choice>
+        <mc:Fallback>
+          <p:pic>
+            <p:nvPicPr>
+              <p:cNvPr id="34" name="Ink 33">
+                <a:extLst>
+                  <a:ext uri="{FF2B5EF4-FFF2-40B4-BE49-F238E27FC236}">
+                    <a16:creationId xmlns:a16="http://schemas.microsoft.com/office/drawing/2014/main" id="{04106AAE-C853-E672-B5DF-97DFAF660C13}"/>
+                  </a:ext>
+                </a:extLst>
+              </p:cNvPr>
+              <p:cNvPicPr/>
+              <p:nvPr/>
+            </p:nvPicPr>
+            <p:blipFill>
+              <a:blip r:embed="rId32"/>
+              <a:stretch>
+                <a:fillRect/>
+              </a:stretch>
+            </p:blipFill>
+            <p:spPr>
+              <a:xfrm>
+                <a:off x="2951880" y="2457711"/>
+                <a:ext cx="518400" cy="418320"/>
+              </a:xfrm>
+              <a:prstGeom prst="rect">
+                <a:avLst/>
+              </a:prstGeom>
+            </p:spPr>
+          </p:pic>
+        </mc:Fallback>
+      </mc:AlternateContent>
+      <p:grpSp>
+        <p:nvGrpSpPr>
+          <p:cNvPr id="40" name="Group 39">
+            <a:extLst>
+              <a:ext uri="{FF2B5EF4-FFF2-40B4-BE49-F238E27FC236}">
+                <a16:creationId xmlns:a16="http://schemas.microsoft.com/office/drawing/2014/main" id="{EFC32C78-1D45-1A00-64A9-E5214F698026}"/>
+              </a:ext>
+            </a:extLst>
+          </p:cNvPr>
+          <p:cNvGrpSpPr/>
+          <p:nvPr/>
+        </p:nvGrpSpPr>
+        <p:grpSpPr>
+          <a:xfrm>
+            <a:off x="68495" y="6272305"/>
+            <a:ext cx="2527560" cy="487440"/>
+            <a:chOff x="68495" y="6272305"/>
+            <a:chExt cx="2527560" cy="487440"/>
+          </a:xfrm>
+        </p:grpSpPr>
+        <mc:AlternateContent xmlns:mc="http://schemas.openxmlformats.org/markup-compatibility/2006">
+          <mc:Choice xmlns:p14="http://schemas.microsoft.com/office/powerpoint/2010/main" Requires="p14">
+            <p:contentPart p14:bwMode="auto" r:id="rId33">
+              <p14:nvContentPartPr>
+                <p14:cNvPr id="37" name="Ink 36">
+                  <a:extLst>
+                    <a:ext uri="{FF2B5EF4-FFF2-40B4-BE49-F238E27FC236}">
+                      <a16:creationId xmlns:a16="http://schemas.microsoft.com/office/drawing/2014/main" id="{9DB462D4-684A-00CA-7CDE-EC2178AD542D}"/>
+                    </a:ext>
+                  </a:extLst>
+                </p14:cNvPr>
+                <p14:cNvContentPartPr/>
+                <p14:nvPr/>
+              </p14:nvContentPartPr>
+              <p14:xfrm>
+                <a:off x="1858415" y="6295345"/>
+                <a:ext cx="737640" cy="173880"/>
+              </p14:xfrm>
+            </p:contentPart>
+          </mc:Choice>
+          <mc:Fallback>
+            <p:pic>
+              <p:nvPicPr>
+                <p:cNvPr id="37" name="Ink 36">
+                  <a:extLst>
+                    <a:ext uri="{FF2B5EF4-FFF2-40B4-BE49-F238E27FC236}">
+                      <a16:creationId xmlns:a16="http://schemas.microsoft.com/office/drawing/2014/main" id="{9DB462D4-684A-00CA-7CDE-EC2178AD542D}"/>
+                    </a:ext>
+                  </a:extLst>
+                </p:cNvPr>
+                <p:cNvPicPr/>
+                <p:nvPr/>
+              </p:nvPicPr>
+              <p:blipFill>
+                <a:blip r:embed="rId34"/>
+                <a:stretch>
+                  <a:fillRect/>
+                </a:stretch>
+              </p:blipFill>
+              <p:spPr>
+                <a:xfrm>
+                  <a:off x="1840415" y="6277705"/>
+                  <a:ext cx="773280" cy="209520"/>
+                </a:xfrm>
+                <a:prstGeom prst="rect">
+                  <a:avLst/>
+                </a:prstGeom>
+              </p:spPr>
+            </p:pic>
+          </mc:Fallback>
+        </mc:AlternateContent>
+        <mc:AlternateContent xmlns:mc="http://schemas.openxmlformats.org/markup-compatibility/2006">
+          <mc:Choice xmlns:p14="http://schemas.microsoft.com/office/powerpoint/2010/main" Requires="p14">
+            <p:contentPart p14:bwMode="auto" r:id="rId35">
+              <p14:nvContentPartPr>
+                <p14:cNvPr id="38" name="Ink 37">
+                  <a:extLst>
+                    <a:ext uri="{FF2B5EF4-FFF2-40B4-BE49-F238E27FC236}">
+                      <a16:creationId xmlns:a16="http://schemas.microsoft.com/office/drawing/2014/main" id="{65014A7D-25F0-171B-F9BF-C2C58AB1B7A9}"/>
+                    </a:ext>
+                  </a:extLst>
+                </p14:cNvPr>
+                <p14:cNvContentPartPr/>
+                <p14:nvPr/>
+              </p14:nvContentPartPr>
+              <p14:xfrm>
+                <a:off x="68495" y="6272305"/>
+                <a:ext cx="1814760" cy="487440"/>
+              </p14:xfrm>
+            </p:contentPart>
+          </mc:Choice>
+          <mc:Fallback>
+            <p:pic>
+              <p:nvPicPr>
+                <p:cNvPr id="38" name="Ink 37">
+                  <a:extLst>
+                    <a:ext uri="{FF2B5EF4-FFF2-40B4-BE49-F238E27FC236}">
+                      <a16:creationId xmlns:a16="http://schemas.microsoft.com/office/drawing/2014/main" id="{65014A7D-25F0-171B-F9BF-C2C58AB1B7A9}"/>
+                    </a:ext>
+                  </a:extLst>
+                </p:cNvPr>
+                <p:cNvPicPr/>
+                <p:nvPr/>
+              </p:nvPicPr>
+              <p:blipFill>
+                <a:blip r:embed="rId36"/>
+                <a:stretch>
+                  <a:fillRect/>
+                </a:stretch>
+              </p:blipFill>
+              <p:spPr>
+                <a:xfrm>
+                  <a:off x="50855" y="6254305"/>
+                  <a:ext cx="1850400" cy="523080"/>
+                </a:xfrm>
+                <a:prstGeom prst="rect">
+                  <a:avLst/>
+                </a:prstGeom>
+              </p:spPr>
+            </p:pic>
+          </mc:Fallback>
+        </mc:AlternateContent>
+        <mc:AlternateContent xmlns:mc="http://schemas.openxmlformats.org/markup-compatibility/2006">
+          <mc:Choice xmlns:p14="http://schemas.microsoft.com/office/powerpoint/2010/main" Requires="p14">
+            <p:contentPart p14:bwMode="auto" r:id="rId37">
+              <p14:nvContentPartPr>
+                <p14:cNvPr id="39" name="Ink 38">
+                  <a:extLst>
+                    <a:ext uri="{FF2B5EF4-FFF2-40B4-BE49-F238E27FC236}">
+                      <a16:creationId xmlns:a16="http://schemas.microsoft.com/office/drawing/2014/main" id="{3A96A189-17A9-2DE6-E1EF-974F68C0B959}"/>
+                    </a:ext>
+                  </a:extLst>
+                </p14:cNvPr>
+                <p14:cNvContentPartPr/>
+                <p14:nvPr/>
+              </p14:nvContentPartPr>
+              <p14:xfrm>
+                <a:off x="1842935" y="6327385"/>
+                <a:ext cx="224640" cy="257400"/>
+              </p14:xfrm>
+            </p:contentPart>
+          </mc:Choice>
+          <mc:Fallback>
+            <p:pic>
+              <p:nvPicPr>
+                <p:cNvPr id="39" name="Ink 38">
+                  <a:extLst>
+                    <a:ext uri="{FF2B5EF4-FFF2-40B4-BE49-F238E27FC236}">
+                      <a16:creationId xmlns:a16="http://schemas.microsoft.com/office/drawing/2014/main" id="{3A96A189-17A9-2DE6-E1EF-974F68C0B959}"/>
+                    </a:ext>
+                  </a:extLst>
+                </p:cNvPr>
+                <p:cNvPicPr/>
+                <p:nvPr/>
+              </p:nvPicPr>
+              <p:blipFill>
+                <a:blip r:embed="rId38"/>
+                <a:stretch>
+                  <a:fillRect/>
+                </a:stretch>
+              </p:blipFill>
+              <p:spPr>
+                <a:xfrm>
+                  <a:off x="1824935" y="6309385"/>
+                  <a:ext cx="260280" cy="293040"/>
+                </a:xfrm>
+                <a:prstGeom prst="rect">
+                  <a:avLst/>
+                </a:prstGeom>
+              </p:spPr>
+            </p:pic>
+          </mc:Fallback>
+        </mc:AlternateContent>
+      </p:grpSp>
     </p:spTree>
     <p:extLst>
       <p:ext uri="{BB962C8B-B14F-4D97-AF65-F5344CB8AC3E}">
@@ -9882,6 +10876,43 @@
           <a:ln>
             <a:solidFill>
               <a:schemeClr val="tx1"/>
+            </a:solidFill>
+          </a:ln>
+        </p:spPr>
+      </p:pic>
+      <p:pic>
+        <p:nvPicPr>
+          <p:cNvPr id="11" name="Picture 10">
+            <a:extLst>
+              <a:ext uri="{FF2B5EF4-FFF2-40B4-BE49-F238E27FC236}">
+                <a16:creationId xmlns:a16="http://schemas.microsoft.com/office/drawing/2014/main" id="{0024698E-7680-B39D-AA28-1BF0D0049D82}"/>
+              </a:ext>
+            </a:extLst>
+          </p:cNvPr>
+          <p:cNvPicPr>
+            <a:picLocks noChangeAspect="1"/>
+          </p:cNvPicPr>
+          <p:nvPr/>
+        </p:nvPicPr>
+        <p:blipFill>
+          <a:blip r:embed="rId5"/>
+          <a:srcRect t="42771"/>
+          <a:stretch/>
+        </p:blipFill>
+        <p:spPr>
+          <a:xfrm>
+            <a:off x="323342" y="3953510"/>
+            <a:ext cx="3639058" cy="1390199"/>
+          </a:xfrm>
+          <a:prstGeom prst="rect">
+            <a:avLst/>
+          </a:prstGeom>
+          <a:solidFill>
+            <a:srgbClr val="00B0F0"/>
+          </a:solidFill>
+          <a:ln w="19050">
+            <a:solidFill>
+              <a:srgbClr val="00B0F0"/>
             </a:solidFill>
           </a:ln>
         </p:spPr>
@@ -11614,15 +12645,6 @@
 </file>
 
 <file path=customXml/item1.xml><?xml version="1.0" encoding="utf-8"?>
-<?mso-contentType ?>
-<FormTemplates xmlns="http://schemas.microsoft.com/sharepoint/v3/contenttype/forms">
-  <Display>DocumentLibraryForm</Display>
-  <Edit>DocumentLibraryForm</Edit>
-  <New>DocumentLibraryForm</New>
-</FormTemplates>
-</file>
-
-<file path=customXml/item2.xml><?xml version="1.0" encoding="utf-8"?>
 <ct:contentTypeSchema xmlns:ct="http://schemas.microsoft.com/office/2006/metadata/contentType" xmlns:ma="http://schemas.microsoft.com/office/2006/metadata/properties/metaAttributes" ct:_="" ma:_="" ma:contentTypeName="Document" ma:contentTypeID="0x0101004285D81DBE5F5A448E892B34D6B8CF20" ma:contentTypeVersion="2" ma:contentTypeDescription="Create a new document." ma:contentTypeScope="" ma:versionID="026ccaf10de5d9915dfa48c6db16b59b">
   <xsd:schema xmlns:xsd="http://www.w3.org/2001/XMLSchema" xmlns:xs="http://www.w3.org/2001/XMLSchema" xmlns:p="http://schemas.microsoft.com/office/2006/metadata/properties" xmlns:ns2="08600313-7276-4ca7-b5d3-7d86193ee0ac" targetNamespace="http://schemas.microsoft.com/office/2006/metadata/properties" ma:root="true" ma:fieldsID="c887e4ee215f388544e22a2030d7ea35" ns2:_="">
     <xsd:import namespace="08600313-7276-4ca7-b5d3-7d86193ee0ac"/>
@@ -11754,6 +12776,15 @@
 </ct:contentTypeSchema>
 </file>
 
+<file path=customXml/item2.xml><?xml version="1.0" encoding="utf-8"?>
+<?mso-contentType ?>
+<FormTemplates xmlns="http://schemas.microsoft.com/sharepoint/v3/contenttype/forms">
+  <Display>DocumentLibraryForm</Display>
+  <Edit>DocumentLibraryForm</Edit>
+  <New>DocumentLibraryForm</New>
+</FormTemplates>
+</file>
+
 <file path=customXml/item3.xml><?xml version="1.0" encoding="utf-8"?>
 <p:properties xmlns:p="http://schemas.microsoft.com/office/2006/metadata/properties" xmlns:xsi="http://www.w3.org/2001/XMLSchema-instance" xmlns:pc="http://schemas.microsoft.com/office/infopath/2007/PartnerControls">
   <documentManagement/>
@@ -11761,14 +12792,6 @@
 </file>
 
 <file path=customXml/itemProps1.xml><?xml version="1.0" encoding="utf-8"?>
-<ds:datastoreItem xmlns:ds="http://schemas.openxmlformats.org/officeDocument/2006/customXml" ds:itemID="{17FAF4A3-64B4-43E8-BB8B-B01EB9ECAC06}">
-  <ds:schemaRefs>
-    <ds:schemaRef ds:uri="http://schemas.microsoft.com/sharepoint/v3/contenttype/forms"/>
-  </ds:schemaRefs>
-</ds:datastoreItem>
-</file>
-
-<file path=customXml/itemProps2.xml><?xml version="1.0" encoding="utf-8"?>
 <ds:datastoreItem xmlns:ds="http://schemas.openxmlformats.org/officeDocument/2006/customXml" ds:itemID="{FB830662-5179-45C5-B8BB-41FD5024BBF4}">
   <ds:schemaRefs>
     <ds:schemaRef ds:uri="http://schemas.microsoft.com/office/2006/metadata/contentType"/>
@@ -11782,6 +12805,14 @@
     <ds:schemaRef ds:uri="http://purl.org/dc/elements/1.1/"/>
     <ds:schemaRef ds:uri="http://purl.org/dc/terms/"/>
     <ds:schemaRef ds:uri="http://schemas.microsoft.com/internal/obd"/>
+  </ds:schemaRefs>
+</ds:datastoreItem>
+</file>
+
+<file path=customXml/itemProps2.xml><?xml version="1.0" encoding="utf-8"?>
+<ds:datastoreItem xmlns:ds="http://schemas.openxmlformats.org/officeDocument/2006/customXml" ds:itemID="{17FAF4A3-64B4-43E8-BB8B-B01EB9ECAC06}">
+  <ds:schemaRefs>
+    <ds:schemaRef ds:uri="http://schemas.microsoft.com/sharepoint/v3/contenttype/forms"/>
   </ds:schemaRefs>
 </ds:datastoreItem>
 </file>

</xml_diff>